<commit_message>
chore: minor update the slide
</commit_message>
<xml_diff>
--- a/slides/RNN_0331.pptx
+++ b/slides/RNN_0331.pptx
@@ -6416,8 +6416,8 @@
           </a:p>
         </p:txBody>
       </p:sp>
-      <mc:AlternateContent xmlns:mc="http://schemas.openxmlformats.org/markup-compatibility/2006" xmlns:a14="http://schemas.microsoft.com/office/drawing/2010/main">
-        <mc:Choice Requires="a14">
+      <mc:AlternateContent xmlns:mc="http://schemas.openxmlformats.org/markup-compatibility/2006">
+        <mc:Choice xmlns:a14="http://schemas.microsoft.com/office/drawing/2010/main" Requires="a14">
           <p:sp>
             <p:nvSpPr>
               <p:cNvPr id="19" name="文字方塊 18">
@@ -6457,7 +6457,7 @@
                         <a:rPr lang="en-US" altLang="zh-TW" sz="2000" b="0" i="1" smtClean="0">
                           <a:latin typeface="Cambria Math" panose="02040503050406030204" pitchFamily="18" charset="0"/>
                         </a:rPr>
-                        <m:t>𝑊</m:t>
+                        <m:t>𝑈</m:t>
                       </m:r>
                     </m:oMath>
                   </m:oMathPara>
@@ -6467,7 +6467,7 @@
             </p:txBody>
           </p:sp>
         </mc:Choice>
-        <mc:Fallback xmlns="">
+        <mc:Fallback>
           <p:sp>
             <p:nvSpPr>
               <p:cNvPr id="19" name="文字方塊 18">
@@ -6512,8 +6512,8 @@
           </p:sp>
         </mc:Fallback>
       </mc:AlternateContent>
-      <mc:AlternateContent xmlns:mc="http://schemas.openxmlformats.org/markup-compatibility/2006" xmlns:a14="http://schemas.microsoft.com/office/drawing/2010/main">
-        <mc:Choice Requires="a14">
+      <mc:AlternateContent xmlns:mc="http://schemas.openxmlformats.org/markup-compatibility/2006">
+        <mc:Choice xmlns:a14="http://schemas.microsoft.com/office/drawing/2010/main" Requires="a14">
           <p:sp>
             <p:nvSpPr>
               <p:cNvPr id="20" name="文字方塊 19">
@@ -6553,7 +6553,7 @@
                         <a:rPr lang="en-US" altLang="zh-TW" sz="2000" b="0" i="1" smtClean="0">
                           <a:latin typeface="Cambria Math" panose="02040503050406030204" pitchFamily="18" charset="0"/>
                         </a:rPr>
-                        <m:t>𝑈</m:t>
+                        <m:t>𝑊</m:t>
                       </m:r>
                     </m:oMath>
                   </m:oMathPara>
@@ -6563,7 +6563,7 @@
             </p:txBody>
           </p:sp>
         </mc:Choice>
-        <mc:Fallback xmlns="">
+        <mc:Fallback>
           <p:sp>
             <p:nvSpPr>
               <p:cNvPr id="20" name="文字方塊 19">
@@ -7206,6 +7206,285 @@
           </mc:Fallback>
         </mc:AlternateContent>
       </p:grpSp>
+      <mc:AlternateContent xmlns:mc="http://schemas.openxmlformats.org/markup-compatibility/2006">
+        <mc:Choice xmlns:a14="http://schemas.microsoft.com/office/drawing/2010/main" Requires="a14">
+          <p:sp>
+            <p:nvSpPr>
+              <p:cNvPr id="3" name="文字方塊 2">
+                <a:extLst>
+                  <a:ext uri="{FF2B5EF4-FFF2-40B4-BE49-F238E27FC236}">
+                    <a16:creationId xmlns:a16="http://schemas.microsoft.com/office/drawing/2014/main" id="{92F5BE48-A79D-1F17-0385-988AE60B39F1}"/>
+                  </a:ext>
+                </a:extLst>
+              </p:cNvPr>
+              <p:cNvSpPr txBox="1"/>
+              <p:nvPr/>
+            </p:nvSpPr>
+            <p:spPr>
+              <a:xfrm>
+                <a:off x="3404681" y="3228945"/>
+                <a:ext cx="282102" cy="400110"/>
+              </a:xfrm>
+              <a:prstGeom prst="rect">
+                <a:avLst/>
+              </a:prstGeom>
+              <a:solidFill>
+                <a:schemeClr val="bg1"/>
+              </a:solidFill>
+            </p:spPr>
+            <p:txBody>
+              <a:bodyPr wrap="square" rtlCol="0">
+                <a:spAutoFit/>
+              </a:bodyPr>
+              <a:lstStyle/>
+              <a:p>
+                <a:pPr/>
+                <a14:m>
+                  <m:oMathPara xmlns:m="http://schemas.openxmlformats.org/officeDocument/2006/math">
+                    <m:oMathParaPr>
+                      <m:jc m:val="centerGroup"/>
+                    </m:oMathParaPr>
+                    <m:oMath xmlns:m="http://schemas.openxmlformats.org/officeDocument/2006/math">
+                      <m:r>
+                        <a:rPr lang="en-US" altLang="zh-TW" sz="2000" b="0" i="1" smtClean="0">
+                          <a:latin typeface="Cambria Math" panose="02040503050406030204" pitchFamily="18" charset="0"/>
+                        </a:rPr>
+                        <m:t>𝑈</m:t>
+                      </m:r>
+                    </m:oMath>
+                  </m:oMathPara>
+                </a14:m>
+                <a:endParaRPr lang="zh-TW" altLang="en-US" sz="2000" dirty="0"/>
+              </a:p>
+            </p:txBody>
+          </p:sp>
+        </mc:Choice>
+        <mc:Fallback>
+          <p:sp>
+            <p:nvSpPr>
+              <p:cNvPr id="3" name="文字方塊 2">
+                <a:extLst>
+                  <a:ext uri="{FF2B5EF4-FFF2-40B4-BE49-F238E27FC236}">
+                    <a16:creationId xmlns:a16="http://schemas.microsoft.com/office/drawing/2014/main" id="{92F5BE48-A79D-1F17-0385-988AE60B39F1}"/>
+                  </a:ext>
+                </a:extLst>
+              </p:cNvPr>
+              <p:cNvSpPr txBox="1">
+                <a:spLocks noRot="1" noChangeAspect="1" noMove="1" noResize="1" noEditPoints="1" noAdjustHandles="1" noChangeArrowheads="1" noChangeShapeType="1" noTextEdit="1"/>
+              </p:cNvSpPr>
+              <p:nvPr/>
+            </p:nvSpPr>
+            <p:spPr>
+              <a:xfrm>
+                <a:off x="3404681" y="3228945"/>
+                <a:ext cx="282102" cy="400110"/>
+              </a:xfrm>
+              <a:prstGeom prst="rect">
+                <a:avLst/>
+              </a:prstGeom>
+              <a:blipFill>
+                <a:blip r:embed="rId10"/>
+                <a:stretch>
+                  <a:fillRect r="-21739"/>
+                </a:stretch>
+              </a:blipFill>
+            </p:spPr>
+            <p:txBody>
+              <a:bodyPr/>
+              <a:lstStyle/>
+              <a:p>
+                <a:r>
+                  <a:rPr lang="zh-TW" altLang="en-US">
+                    <a:noFill/>
+                  </a:rPr>
+                  <a:t> </a:t>
+                </a:r>
+              </a:p>
+            </p:txBody>
+          </p:sp>
+        </mc:Fallback>
+      </mc:AlternateContent>
+      <mc:AlternateContent xmlns:mc="http://schemas.openxmlformats.org/markup-compatibility/2006">
+        <mc:Choice xmlns:a14="http://schemas.microsoft.com/office/drawing/2010/main" Requires="a14">
+          <p:sp>
+            <p:nvSpPr>
+              <p:cNvPr id="8" name="文字方塊 7">
+                <a:extLst>
+                  <a:ext uri="{FF2B5EF4-FFF2-40B4-BE49-F238E27FC236}">
+                    <a16:creationId xmlns:a16="http://schemas.microsoft.com/office/drawing/2014/main" id="{2B452FBC-01C1-D01A-E37E-7CFFD5721E0C}"/>
+                  </a:ext>
+                </a:extLst>
+              </p:cNvPr>
+              <p:cNvSpPr txBox="1"/>
+              <p:nvPr/>
+            </p:nvSpPr>
+            <p:spPr>
+              <a:xfrm>
+                <a:off x="2363949" y="3244334"/>
+                <a:ext cx="2081464" cy="369332"/>
+              </a:xfrm>
+              <a:prstGeom prst="rect">
+                <a:avLst/>
+              </a:prstGeom>
+              <a:solidFill>
+                <a:schemeClr val="bg1"/>
+              </a:solidFill>
+            </p:spPr>
+            <p:txBody>
+              <a:bodyPr wrap="square" rtlCol="0">
+                <a:spAutoFit/>
+              </a:bodyPr>
+              <a:lstStyle/>
+              <a:p>
+                <a:pPr/>
+                <a14:m>
+                  <m:oMathPara xmlns:m="http://schemas.openxmlformats.org/officeDocument/2006/math">
+                    <m:oMathParaPr>
+                      <m:jc m:val="left"/>
+                    </m:oMathParaPr>
+                    <m:oMath xmlns:m="http://schemas.openxmlformats.org/officeDocument/2006/math">
+                      <m:r>
+                        <a:rPr lang="en-US" altLang="zh-TW" b="0" i="1" smtClean="0">
+                          <a:latin typeface="Cambria Math" panose="02040503050406030204" pitchFamily="18" charset="0"/>
+                        </a:rPr>
+                        <m:t>𝑓</m:t>
+                      </m:r>
+                      <m:r>
+                        <a:rPr lang="en-US" altLang="zh-TW" b="0" i="1" smtClean="0">
+                          <a:latin typeface="Cambria Math" panose="02040503050406030204" pitchFamily="18" charset="0"/>
+                        </a:rPr>
+                        <m:t>=</m:t>
+                      </m:r>
+                      <m:r>
+                        <a:rPr lang="en-US" altLang="zh-TW" b="0" i="1" smtClean="0">
+                          <a:latin typeface="Cambria Math" panose="02040503050406030204" pitchFamily="18" charset="0"/>
+                        </a:rPr>
+                        <m:t>𝑊</m:t>
+                      </m:r>
+                      <m:sSub>
+                        <m:sSubPr>
+                          <m:ctrlPr>
+                            <a:rPr lang="zh-TW" altLang="en-US" i="1">
+                              <a:latin typeface="Cambria Math" panose="02040503050406030204" pitchFamily="18" charset="0"/>
+                            </a:rPr>
+                          </m:ctrlPr>
+                        </m:sSubPr>
+                        <m:e>
+                          <m:r>
+                            <a:rPr lang="en-US" altLang="zh-TW" i="1">
+                              <a:latin typeface="Cambria Math" panose="02040503050406030204" pitchFamily="18" charset="0"/>
+                            </a:rPr>
+                            <m:t>𝑥</m:t>
+                          </m:r>
+                        </m:e>
+                        <m:sub>
+                          <m:r>
+                            <a:rPr lang="zh-TW" altLang="en-US" i="1">
+                              <a:latin typeface="Cambria Math" panose="02040503050406030204" pitchFamily="18" charset="0"/>
+                            </a:rPr>
+                            <m:t>𝑡</m:t>
+                          </m:r>
+                        </m:sub>
+                      </m:sSub>
+                      <m:r>
+                        <a:rPr lang="en-US" altLang="zh-TW" b="0" i="1" smtClean="0">
+                          <a:latin typeface="Cambria Math" panose="02040503050406030204" pitchFamily="18" charset="0"/>
+                        </a:rPr>
+                        <m:t>+</m:t>
+                      </m:r>
+                      <m:r>
+                        <a:rPr lang="en-US" altLang="zh-TW" i="1">
+                          <a:latin typeface="Cambria Math" panose="02040503050406030204" pitchFamily="18" charset="0"/>
+                        </a:rPr>
+                        <m:t>𝑈</m:t>
+                      </m:r>
+                      <m:sSub>
+                        <m:sSubPr>
+                          <m:ctrlPr>
+                            <a:rPr lang="zh-TW" altLang="en-US" i="1">
+                              <a:solidFill>
+                                <a:srgbClr val="836967"/>
+                              </a:solidFill>
+                              <a:latin typeface="Cambria Math" panose="02040503050406030204" pitchFamily="18" charset="0"/>
+                            </a:rPr>
+                          </m:ctrlPr>
+                        </m:sSubPr>
+                        <m:e>
+                          <m:r>
+                            <a:rPr lang="zh-TW" altLang="en-US" i="1">
+                              <a:latin typeface="Cambria Math" panose="02040503050406030204" pitchFamily="18" charset="0"/>
+                            </a:rPr>
+                            <m:t>h</m:t>
+                          </m:r>
+                        </m:e>
+                        <m:sub>
+                          <m:r>
+                            <a:rPr lang="zh-TW" altLang="en-US" i="1">
+                              <a:latin typeface="Cambria Math" panose="02040503050406030204" pitchFamily="18" charset="0"/>
+                            </a:rPr>
+                            <m:t>𝑡</m:t>
+                          </m:r>
+                          <m:r>
+                            <a:rPr lang="zh-TW" altLang="en-US">
+                              <a:latin typeface="Cambria Math" panose="02040503050406030204" pitchFamily="18" charset="0"/>
+                            </a:rPr>
+                            <m:t>−1</m:t>
+                          </m:r>
+                        </m:sub>
+                      </m:sSub>
+                    </m:oMath>
+                  </m:oMathPara>
+                </a14:m>
+                <a:endParaRPr lang="zh-TW" altLang="en-US" dirty="0"/>
+              </a:p>
+            </p:txBody>
+          </p:sp>
+        </mc:Choice>
+        <mc:Fallback>
+          <p:sp>
+            <p:nvSpPr>
+              <p:cNvPr id="8" name="文字方塊 7">
+                <a:extLst>
+                  <a:ext uri="{FF2B5EF4-FFF2-40B4-BE49-F238E27FC236}">
+                    <a16:creationId xmlns:a16="http://schemas.microsoft.com/office/drawing/2014/main" id="{2B452FBC-01C1-D01A-E37E-7CFFD5721E0C}"/>
+                  </a:ext>
+                </a:extLst>
+              </p:cNvPr>
+              <p:cNvSpPr txBox="1">
+                <a:spLocks noRot="1" noChangeAspect="1" noMove="1" noResize="1" noEditPoints="1" noAdjustHandles="1" noChangeArrowheads="1" noChangeShapeType="1" noTextEdit="1"/>
+              </p:cNvSpPr>
+              <p:nvPr/>
+            </p:nvSpPr>
+            <p:spPr>
+              <a:xfrm>
+                <a:off x="2363949" y="3244334"/>
+                <a:ext cx="2081464" cy="369332"/>
+              </a:xfrm>
+              <a:prstGeom prst="rect">
+                <a:avLst/>
+              </a:prstGeom>
+              <a:blipFill>
+                <a:blip r:embed="rId11"/>
+                <a:stretch>
+                  <a:fillRect l="-1220" b="-13333"/>
+                </a:stretch>
+              </a:blipFill>
+            </p:spPr>
+            <p:txBody>
+              <a:bodyPr/>
+              <a:lstStyle/>
+              <a:p>
+                <a:r>
+                  <a:rPr lang="zh-TW" altLang="en-US">
+                    <a:noFill/>
+                  </a:rPr>
+                  <a:t> </a:t>
+                </a:r>
+              </a:p>
+            </p:txBody>
+          </p:sp>
+        </mc:Fallback>
+      </mc:AlternateContent>
     </p:spTree>
     <p:extLst>
       <p:ext uri="{BB962C8B-B14F-4D97-AF65-F5344CB8AC3E}">
@@ -31060,6 +31339,1335 @@
           </a:p>
         </p:txBody>
       </p:sp>
+      <p:grpSp>
+        <p:nvGrpSpPr>
+          <p:cNvPr id="61" name="群組 60">
+            <a:extLst>
+              <a:ext uri="{FF2B5EF4-FFF2-40B4-BE49-F238E27FC236}">
+                <a16:creationId xmlns:a16="http://schemas.microsoft.com/office/drawing/2014/main" id="{70571448-4EB6-D4D2-4EE7-90C119D280CA}"/>
+              </a:ext>
+            </a:extLst>
+          </p:cNvPr>
+          <p:cNvGrpSpPr/>
+          <p:nvPr/>
+        </p:nvGrpSpPr>
+        <p:grpSpPr>
+          <a:xfrm>
+            <a:off x="9074063" y="830059"/>
+            <a:ext cx="2758259" cy="3831722"/>
+            <a:chOff x="7322626" y="1829776"/>
+            <a:chExt cx="3317876" cy="4569386"/>
+          </a:xfrm>
+        </p:grpSpPr>
+        <p:grpSp>
+          <p:nvGrpSpPr>
+            <p:cNvPr id="3" name="群組 2">
+              <a:extLst>
+                <a:ext uri="{FF2B5EF4-FFF2-40B4-BE49-F238E27FC236}">
+                  <a16:creationId xmlns:a16="http://schemas.microsoft.com/office/drawing/2014/main" id="{A4089874-23FA-E65A-4533-EA1AC293BDB3}"/>
+                </a:ext>
+              </a:extLst>
+            </p:cNvPr>
+            <p:cNvGrpSpPr/>
+            <p:nvPr/>
+          </p:nvGrpSpPr>
+          <p:grpSpPr>
+            <a:xfrm>
+              <a:off x="7322626" y="5908968"/>
+              <a:ext cx="895546" cy="490194"/>
+              <a:chOff x="7654565" y="5128181"/>
+              <a:chExt cx="895546" cy="490194"/>
+            </a:xfrm>
+          </p:grpSpPr>
+          <p:sp>
+            <p:nvSpPr>
+              <p:cNvPr id="15" name="圓角矩形 14">
+                <a:extLst>
+                  <a:ext uri="{FF2B5EF4-FFF2-40B4-BE49-F238E27FC236}">
+                    <a16:creationId xmlns:a16="http://schemas.microsoft.com/office/drawing/2014/main" id="{248A531F-E4B2-4382-0448-4A663E6430FF}"/>
+                  </a:ext>
+                </a:extLst>
+              </p:cNvPr>
+              <p:cNvSpPr/>
+              <p:nvPr/>
+            </p:nvSpPr>
+            <p:spPr>
+              <a:xfrm>
+                <a:off x="7654565" y="5128181"/>
+                <a:ext cx="895546" cy="490194"/>
+              </a:xfrm>
+              <a:prstGeom prst="roundRect">
+                <a:avLst/>
+              </a:prstGeom>
+              <a:solidFill>
+                <a:schemeClr val="accent2">
+                  <a:lumMod val="20000"/>
+                  <a:lumOff val="80000"/>
+                </a:schemeClr>
+              </a:solidFill>
+              <a:ln>
+                <a:solidFill>
+                  <a:schemeClr val="accent2"/>
+                </a:solidFill>
+              </a:ln>
+            </p:spPr>
+            <p:style>
+              <a:lnRef idx="2">
+                <a:schemeClr val="accent1">
+                  <a:shade val="50000"/>
+                </a:schemeClr>
+              </a:lnRef>
+              <a:fillRef idx="1">
+                <a:schemeClr val="accent1"/>
+              </a:fillRef>
+              <a:effectRef idx="0">
+                <a:schemeClr val="accent1"/>
+              </a:effectRef>
+              <a:fontRef idx="minor">
+                <a:schemeClr val="lt1"/>
+              </a:fontRef>
+            </p:style>
+            <p:txBody>
+              <a:bodyPr rtlCol="0" anchor="ctr"/>
+              <a:lstStyle/>
+              <a:p>
+                <a:pPr algn="ctr"/>
+                <a:endParaRPr kumimoji="1" lang="zh-TW" altLang="en-US"/>
+              </a:p>
+            </p:txBody>
+          </p:sp>
+          <mc:AlternateContent xmlns:mc="http://schemas.openxmlformats.org/markup-compatibility/2006" xmlns:a14="http://schemas.microsoft.com/office/drawing/2010/main">
+            <mc:Choice Requires="a14">
+              <p:sp>
+                <p:nvSpPr>
+                  <p:cNvPr id="16" name="文字方塊 15">
+                    <a:extLst>
+                      <a:ext uri="{FF2B5EF4-FFF2-40B4-BE49-F238E27FC236}">
+                        <a16:creationId xmlns:a16="http://schemas.microsoft.com/office/drawing/2014/main" id="{875987AE-E79B-378D-3D97-22DDDD0470B2}"/>
+                      </a:ext>
+                    </a:extLst>
+                  </p:cNvPr>
+                  <p:cNvSpPr txBox="1"/>
+                  <p:nvPr/>
+                </p:nvSpPr>
+                <p:spPr>
+                  <a:xfrm>
+                    <a:off x="7768865" y="5173223"/>
+                    <a:ext cx="666946" cy="400110"/>
+                  </a:xfrm>
+                  <a:prstGeom prst="rect">
+                    <a:avLst/>
+                  </a:prstGeom>
+                  <a:noFill/>
+                </p:spPr>
+                <p:txBody>
+                  <a:bodyPr wrap="square">
+                    <a:spAutoFit/>
+                  </a:bodyPr>
+                  <a:lstStyle/>
+                  <a:p>
+                    <a:pPr/>
+                    <a14:m>
+                      <m:oMathPara xmlns:m="http://schemas.openxmlformats.org/officeDocument/2006/math">
+                        <m:oMathParaPr>
+                          <m:jc m:val="centerGroup"/>
+                        </m:oMathParaPr>
+                        <m:oMath xmlns:m="http://schemas.openxmlformats.org/officeDocument/2006/math">
+                          <m:sSub>
+                            <m:sSubPr>
+                              <m:ctrlPr>
+                                <a:rPr lang="zh-TW" altLang="en-US" sz="2000" i="1" smtClean="0">
+                                  <a:solidFill>
+                                    <a:srgbClr val="836967"/>
+                                  </a:solidFill>
+                                  <a:latin typeface="Cambria Math" panose="02040503050406030204" pitchFamily="18" charset="0"/>
+                                </a:rPr>
+                              </m:ctrlPr>
+                            </m:sSubPr>
+                            <m:e>
+                              <m:r>
+                                <a:rPr lang="zh-TW" altLang="en-US" sz="2000" i="1">
+                                  <a:latin typeface="Cambria Math" panose="02040503050406030204" pitchFamily="18" charset="0"/>
+                                </a:rPr>
+                                <m:t>h</m:t>
+                              </m:r>
+                            </m:e>
+                            <m:sub>
+                              <m:r>
+                                <a:rPr lang="zh-TW" altLang="en-US" sz="2000" i="1">
+                                  <a:latin typeface="Cambria Math" panose="02040503050406030204" pitchFamily="18" charset="0"/>
+                                </a:rPr>
+                                <m:t>𝑡</m:t>
+                              </m:r>
+                              <m:r>
+                                <a:rPr lang="zh-TW" altLang="en-US" sz="2000" i="0">
+                                  <a:latin typeface="Cambria Math" panose="02040503050406030204" pitchFamily="18" charset="0"/>
+                                </a:rPr>
+                                <m:t>−1</m:t>
+                              </m:r>
+                            </m:sub>
+                          </m:sSub>
+                        </m:oMath>
+                      </m:oMathPara>
+                    </a14:m>
+                    <a:endParaRPr lang="zh-TW" altLang="en-US" sz="2000" dirty="0"/>
+                  </a:p>
+                </p:txBody>
+              </p:sp>
+            </mc:Choice>
+            <mc:Fallback xmlns="">
+              <p:sp>
+                <p:nvSpPr>
+                  <p:cNvPr id="10" name="文字方塊 9">
+                    <a:extLst>
+                      <a:ext uri="{FF2B5EF4-FFF2-40B4-BE49-F238E27FC236}">
+                        <a16:creationId xmlns:a16="http://schemas.microsoft.com/office/drawing/2014/main" id="{437BF961-E223-7FF5-8AE5-8E8E1FB67BFF}"/>
+                      </a:ext>
+                    </a:extLst>
+                  </p:cNvPr>
+                  <p:cNvSpPr txBox="1">
+                    <a:spLocks noRot="1" noChangeAspect="1" noMove="1" noResize="1" noEditPoints="1" noAdjustHandles="1" noChangeArrowheads="1" noChangeShapeType="1" noTextEdit="1"/>
+                  </p:cNvSpPr>
+                  <p:nvPr/>
+                </p:nvSpPr>
+                <p:spPr>
+                  <a:xfrm>
+                    <a:off x="7768865" y="5173223"/>
+                    <a:ext cx="666946" cy="400110"/>
+                  </a:xfrm>
+                  <a:prstGeom prst="rect">
+                    <a:avLst/>
+                  </a:prstGeom>
+                  <a:blipFill>
+                    <a:blip r:embed="rId23"/>
+                    <a:stretch>
+                      <a:fillRect/>
+                    </a:stretch>
+                  </a:blipFill>
+                </p:spPr>
+                <p:txBody>
+                  <a:bodyPr/>
+                  <a:lstStyle/>
+                  <a:p>
+                    <a:r>
+                      <a:rPr lang="zh-TW" altLang="en-US">
+                        <a:noFill/>
+                      </a:rPr>
+                      <a:t> </a:t>
+                    </a:r>
+                  </a:p>
+                </p:txBody>
+              </p:sp>
+            </mc:Fallback>
+          </mc:AlternateContent>
+        </p:grpSp>
+        <p:grpSp>
+          <p:nvGrpSpPr>
+            <p:cNvPr id="19" name="群組 18">
+              <a:extLst>
+                <a:ext uri="{FF2B5EF4-FFF2-40B4-BE49-F238E27FC236}">
+                  <a16:creationId xmlns:a16="http://schemas.microsoft.com/office/drawing/2014/main" id="{5E085CFE-EAE6-6726-8A79-587B4994E3B4}"/>
+                </a:ext>
+              </a:extLst>
+            </p:cNvPr>
+            <p:cNvGrpSpPr/>
+            <p:nvPr/>
+          </p:nvGrpSpPr>
+          <p:grpSpPr>
+            <a:xfrm>
+              <a:off x="9744956" y="5908968"/>
+              <a:ext cx="895546" cy="490194"/>
+              <a:chOff x="7654565" y="5128181"/>
+              <a:chExt cx="895546" cy="490194"/>
+            </a:xfrm>
+          </p:grpSpPr>
+          <p:sp>
+            <p:nvSpPr>
+              <p:cNvPr id="24" name="圓角矩形 23">
+                <a:extLst>
+                  <a:ext uri="{FF2B5EF4-FFF2-40B4-BE49-F238E27FC236}">
+                    <a16:creationId xmlns:a16="http://schemas.microsoft.com/office/drawing/2014/main" id="{EE6A7867-7ADA-FC34-EEB4-784E46FEB86C}"/>
+                  </a:ext>
+                </a:extLst>
+              </p:cNvPr>
+              <p:cNvSpPr/>
+              <p:nvPr/>
+            </p:nvSpPr>
+            <p:spPr>
+              <a:xfrm>
+                <a:off x="7654565" y="5128181"/>
+                <a:ext cx="895546" cy="490194"/>
+              </a:xfrm>
+              <a:prstGeom prst="roundRect">
+                <a:avLst/>
+              </a:prstGeom>
+              <a:solidFill>
+                <a:schemeClr val="accent2">
+                  <a:lumMod val="20000"/>
+                  <a:lumOff val="80000"/>
+                </a:schemeClr>
+              </a:solidFill>
+              <a:ln>
+                <a:solidFill>
+                  <a:schemeClr val="accent2"/>
+                </a:solidFill>
+              </a:ln>
+            </p:spPr>
+            <p:style>
+              <a:lnRef idx="2">
+                <a:schemeClr val="accent1">
+                  <a:shade val="50000"/>
+                </a:schemeClr>
+              </a:lnRef>
+              <a:fillRef idx="1">
+                <a:schemeClr val="accent1"/>
+              </a:fillRef>
+              <a:effectRef idx="0">
+                <a:schemeClr val="accent1"/>
+              </a:effectRef>
+              <a:fontRef idx="minor">
+                <a:schemeClr val="lt1"/>
+              </a:fontRef>
+            </p:style>
+            <p:txBody>
+              <a:bodyPr rtlCol="0" anchor="ctr"/>
+              <a:lstStyle/>
+              <a:p>
+                <a:pPr algn="ctr"/>
+                <a:endParaRPr kumimoji="1" lang="zh-TW" altLang="en-US"/>
+              </a:p>
+            </p:txBody>
+          </p:sp>
+          <mc:AlternateContent xmlns:mc="http://schemas.openxmlformats.org/markup-compatibility/2006" xmlns:a14="http://schemas.microsoft.com/office/drawing/2010/main">
+            <mc:Choice Requires="a14">
+              <p:sp>
+                <p:nvSpPr>
+                  <p:cNvPr id="25" name="文字方塊 24">
+                    <a:extLst>
+                      <a:ext uri="{FF2B5EF4-FFF2-40B4-BE49-F238E27FC236}">
+                        <a16:creationId xmlns:a16="http://schemas.microsoft.com/office/drawing/2014/main" id="{2E6E0BF3-C665-4CF6-4D45-C31EF78A475B}"/>
+                      </a:ext>
+                    </a:extLst>
+                  </p:cNvPr>
+                  <p:cNvSpPr txBox="1"/>
+                  <p:nvPr/>
+                </p:nvSpPr>
+                <p:spPr>
+                  <a:xfrm>
+                    <a:off x="7768865" y="5173223"/>
+                    <a:ext cx="666946" cy="400110"/>
+                  </a:xfrm>
+                  <a:prstGeom prst="rect">
+                    <a:avLst/>
+                  </a:prstGeom>
+                  <a:noFill/>
+                </p:spPr>
+                <p:txBody>
+                  <a:bodyPr wrap="square">
+                    <a:spAutoFit/>
+                  </a:bodyPr>
+                  <a:lstStyle/>
+                  <a:p>
+                    <a:pPr/>
+                    <a14:m>
+                      <m:oMathPara xmlns:m="http://schemas.openxmlformats.org/officeDocument/2006/math">
+                        <m:oMathParaPr>
+                          <m:jc m:val="centerGroup"/>
+                        </m:oMathParaPr>
+                        <m:oMath xmlns:m="http://schemas.openxmlformats.org/officeDocument/2006/math">
+                          <m:sSub>
+                            <m:sSubPr>
+                              <m:ctrlPr>
+                                <a:rPr lang="zh-TW" altLang="en-US" sz="2000" i="1" smtClean="0">
+                                  <a:solidFill>
+                                    <a:schemeClr val="tx1"/>
+                                  </a:solidFill>
+                                  <a:latin typeface="Cambria Math" panose="02040503050406030204" pitchFamily="18" charset="0"/>
+                                </a:rPr>
+                              </m:ctrlPr>
+                            </m:sSubPr>
+                            <m:e>
+                              <m:r>
+                                <a:rPr lang="en-US" altLang="zh-TW" sz="2000" b="0" i="1" smtClean="0">
+                                  <a:solidFill>
+                                    <a:schemeClr val="tx1"/>
+                                  </a:solidFill>
+                                  <a:latin typeface="Cambria Math" panose="02040503050406030204" pitchFamily="18" charset="0"/>
+                                </a:rPr>
+                                <m:t>𝑥</m:t>
+                              </m:r>
+                            </m:e>
+                            <m:sub>
+                              <m:r>
+                                <a:rPr lang="zh-TW" altLang="en-US" sz="2000" i="1">
+                                  <a:solidFill>
+                                    <a:schemeClr val="tx1"/>
+                                  </a:solidFill>
+                                  <a:latin typeface="Cambria Math" panose="02040503050406030204" pitchFamily="18" charset="0"/>
+                                </a:rPr>
+                                <m:t>𝑡</m:t>
+                              </m:r>
+                            </m:sub>
+                          </m:sSub>
+                        </m:oMath>
+                      </m:oMathPara>
+                    </a14:m>
+                    <a:endParaRPr lang="zh-TW" altLang="en-US" sz="2000" dirty="0">
+                      <a:solidFill>
+                        <a:schemeClr val="tx1"/>
+                      </a:solidFill>
+                    </a:endParaRPr>
+                  </a:p>
+                </p:txBody>
+              </p:sp>
+            </mc:Choice>
+            <mc:Fallback xmlns="">
+              <p:sp>
+                <p:nvSpPr>
+                  <p:cNvPr id="15" name="文字方塊 14">
+                    <a:extLst>
+                      <a:ext uri="{FF2B5EF4-FFF2-40B4-BE49-F238E27FC236}">
+                        <a16:creationId xmlns:a16="http://schemas.microsoft.com/office/drawing/2014/main" id="{16569C70-18FB-3D33-E97C-9C217BC077BD}"/>
+                      </a:ext>
+                    </a:extLst>
+                  </p:cNvPr>
+                  <p:cNvSpPr txBox="1">
+                    <a:spLocks noRot="1" noChangeAspect="1" noMove="1" noResize="1" noEditPoints="1" noAdjustHandles="1" noChangeArrowheads="1" noChangeShapeType="1" noTextEdit="1"/>
+                  </p:cNvSpPr>
+                  <p:nvPr/>
+                </p:nvSpPr>
+                <p:spPr>
+                  <a:xfrm>
+                    <a:off x="7768865" y="5173223"/>
+                    <a:ext cx="666946" cy="400110"/>
+                  </a:xfrm>
+                  <a:prstGeom prst="rect">
+                    <a:avLst/>
+                  </a:prstGeom>
+                  <a:blipFill>
+                    <a:blip r:embed="rId24"/>
+                    <a:stretch>
+                      <a:fillRect/>
+                    </a:stretch>
+                  </a:blipFill>
+                </p:spPr>
+                <p:txBody>
+                  <a:bodyPr/>
+                  <a:lstStyle/>
+                  <a:p>
+                    <a:r>
+                      <a:rPr lang="zh-TW" altLang="en-US">
+                        <a:noFill/>
+                      </a:rPr>
+                      <a:t> </a:t>
+                    </a:r>
+                  </a:p>
+                </p:txBody>
+              </p:sp>
+            </mc:Fallback>
+          </mc:AlternateContent>
+        </p:grpSp>
+        <p:sp>
+          <p:nvSpPr>
+            <p:cNvPr id="39" name="平行四邊形 38">
+              <a:extLst>
+                <a:ext uri="{FF2B5EF4-FFF2-40B4-BE49-F238E27FC236}">
+                  <a16:creationId xmlns:a16="http://schemas.microsoft.com/office/drawing/2014/main" id="{9B5B57DB-FA13-6457-C00E-CA2FD3110C34}"/>
+                </a:ext>
+              </a:extLst>
+            </p:cNvPr>
+            <p:cNvSpPr/>
+            <p:nvPr/>
+          </p:nvSpPr>
+          <p:spPr>
+            <a:xfrm>
+              <a:off x="7506447" y="4589215"/>
+              <a:ext cx="1899503" cy="1219078"/>
+            </a:xfrm>
+            <a:prstGeom prst="parallelogram">
+              <a:avLst>
+                <a:gd name="adj" fmla="val 111555"/>
+              </a:avLst>
+            </a:prstGeom>
+            <a:solidFill>
+              <a:schemeClr val="bg1">
+                <a:lumMod val="85000"/>
+              </a:schemeClr>
+            </a:solidFill>
+            <a:ln>
+              <a:noFill/>
+            </a:ln>
+          </p:spPr>
+          <p:style>
+            <a:lnRef idx="2">
+              <a:schemeClr val="accent1">
+                <a:shade val="50000"/>
+              </a:schemeClr>
+            </a:lnRef>
+            <a:fillRef idx="1">
+              <a:schemeClr val="accent1"/>
+            </a:fillRef>
+            <a:effectRef idx="0">
+              <a:schemeClr val="accent1"/>
+            </a:effectRef>
+            <a:fontRef idx="minor">
+              <a:schemeClr val="lt1"/>
+            </a:fontRef>
+          </p:style>
+          <p:txBody>
+            <a:bodyPr rtlCol="0" anchor="ctr"/>
+            <a:lstStyle/>
+            <a:p>
+              <a:pPr algn="ctr"/>
+              <a:endParaRPr kumimoji="1" lang="zh-TW" altLang="en-US" dirty="0"/>
+            </a:p>
+          </p:txBody>
+        </p:sp>
+        <p:sp>
+          <p:nvSpPr>
+            <p:cNvPr id="41" name="不規則四邊形 40">
+              <a:extLst>
+                <a:ext uri="{FF2B5EF4-FFF2-40B4-BE49-F238E27FC236}">
+                  <a16:creationId xmlns:a16="http://schemas.microsoft.com/office/drawing/2014/main" id="{E626C256-8492-168F-0F0F-F82960759296}"/>
+                </a:ext>
+              </a:extLst>
+            </p:cNvPr>
+            <p:cNvSpPr/>
+            <p:nvPr/>
+          </p:nvSpPr>
+          <p:spPr>
+            <a:xfrm>
+              <a:off x="9896963" y="4589215"/>
+              <a:ext cx="591437" cy="1219078"/>
+            </a:xfrm>
+            <a:prstGeom prst="trapezoid">
+              <a:avLst/>
+            </a:prstGeom>
+            <a:solidFill>
+              <a:schemeClr val="bg1">
+                <a:lumMod val="85000"/>
+              </a:schemeClr>
+            </a:solidFill>
+            <a:ln>
+              <a:noFill/>
+            </a:ln>
+          </p:spPr>
+          <p:style>
+            <a:lnRef idx="2">
+              <a:schemeClr val="accent1">
+                <a:shade val="50000"/>
+              </a:schemeClr>
+            </a:lnRef>
+            <a:fillRef idx="1">
+              <a:schemeClr val="accent1"/>
+            </a:fillRef>
+            <a:effectRef idx="0">
+              <a:schemeClr val="accent1"/>
+            </a:effectRef>
+            <a:fontRef idx="minor">
+              <a:schemeClr val="lt1"/>
+            </a:fontRef>
+          </p:style>
+          <p:txBody>
+            <a:bodyPr rtlCol="0" anchor="ctr"/>
+            <a:lstStyle/>
+            <a:p>
+              <a:pPr algn="ctr"/>
+              <a:endParaRPr kumimoji="1" lang="zh-TW" altLang="en-US"/>
+            </a:p>
+          </p:txBody>
+        </p:sp>
+        <mc:AlternateContent xmlns:mc="http://schemas.openxmlformats.org/markup-compatibility/2006">
+          <mc:Choice xmlns:a14="http://schemas.microsoft.com/office/drawing/2010/main" Requires="a14">
+            <p:sp>
+              <p:nvSpPr>
+                <p:cNvPr id="43" name="文字方塊 42">
+                  <a:extLst>
+                    <a:ext uri="{FF2B5EF4-FFF2-40B4-BE49-F238E27FC236}">
+                      <a16:creationId xmlns:a16="http://schemas.microsoft.com/office/drawing/2014/main" id="{BC3B75ED-3CBD-9A55-30D1-2F3911B75C05}"/>
+                    </a:ext>
+                  </a:extLst>
+                </p:cNvPr>
+                <p:cNvSpPr txBox="1"/>
+                <p:nvPr/>
+              </p:nvSpPr>
+              <p:spPr>
+                <a:xfrm>
+                  <a:off x="8188712" y="5014088"/>
+                  <a:ext cx="534971" cy="477137"/>
+                </a:xfrm>
+                <a:prstGeom prst="rect">
+                  <a:avLst/>
+                </a:prstGeom>
+                <a:noFill/>
+              </p:spPr>
+              <p:txBody>
+                <a:bodyPr wrap="square">
+                  <a:spAutoFit/>
+                </a:bodyPr>
+                <a:lstStyle/>
+                <a:p>
+                  <a:pPr/>
+                  <a14:m>
+                    <m:oMathPara xmlns:m="http://schemas.openxmlformats.org/officeDocument/2006/math">
+                      <m:oMathParaPr>
+                        <m:jc m:val="centerGroup"/>
+                      </m:oMathParaPr>
+                      <m:oMath xmlns:m="http://schemas.openxmlformats.org/officeDocument/2006/math">
+                        <m:r>
+                          <a:rPr lang="en-US" altLang="zh-TW" sz="2000" b="0" i="1" smtClean="0">
+                            <a:latin typeface="Cambria Math" panose="02040503050406030204" pitchFamily="18" charset="0"/>
+                          </a:rPr>
+                          <m:t>𝑈</m:t>
+                        </m:r>
+                      </m:oMath>
+                    </m:oMathPara>
+                  </a14:m>
+                  <a:endParaRPr lang="zh-TW" altLang="en-US" sz="2000" dirty="0"/>
+                </a:p>
+              </p:txBody>
+            </p:sp>
+          </mc:Choice>
+          <mc:Fallback>
+            <p:sp>
+              <p:nvSpPr>
+                <p:cNvPr id="43" name="文字方塊 42">
+                  <a:extLst>
+                    <a:ext uri="{FF2B5EF4-FFF2-40B4-BE49-F238E27FC236}">
+                      <a16:creationId xmlns:a16="http://schemas.microsoft.com/office/drawing/2014/main" id="{BC3B75ED-3CBD-9A55-30D1-2F3911B75C05}"/>
+                    </a:ext>
+                  </a:extLst>
+                </p:cNvPr>
+                <p:cNvSpPr txBox="1">
+                  <a:spLocks noRot="1" noChangeAspect="1" noMove="1" noResize="1" noEditPoints="1" noAdjustHandles="1" noChangeArrowheads="1" noChangeShapeType="1" noTextEdit="1"/>
+                </p:cNvSpPr>
+                <p:nvPr/>
+              </p:nvSpPr>
+              <p:spPr>
+                <a:xfrm>
+                  <a:off x="8188712" y="5014088"/>
+                  <a:ext cx="534971" cy="477137"/>
+                </a:xfrm>
+                <a:prstGeom prst="rect">
+                  <a:avLst/>
+                </a:prstGeom>
+                <a:blipFill>
+                  <a:blip r:embed="rId25"/>
+                  <a:stretch>
+                    <a:fillRect/>
+                  </a:stretch>
+                </a:blipFill>
+              </p:spPr>
+              <p:txBody>
+                <a:bodyPr/>
+                <a:lstStyle/>
+                <a:p>
+                  <a:r>
+                    <a:rPr lang="zh-TW" altLang="en-US">
+                      <a:noFill/>
+                    </a:rPr>
+                    <a:t> </a:t>
+                  </a:r>
+                </a:p>
+              </p:txBody>
+            </p:sp>
+          </mc:Fallback>
+        </mc:AlternateContent>
+        <mc:AlternateContent xmlns:mc="http://schemas.openxmlformats.org/markup-compatibility/2006">
+          <mc:Choice xmlns:a14="http://schemas.microsoft.com/office/drawing/2010/main" Requires="a14">
+            <p:sp>
+              <p:nvSpPr>
+                <p:cNvPr id="47" name="文字方塊 46">
+                  <a:extLst>
+                    <a:ext uri="{FF2B5EF4-FFF2-40B4-BE49-F238E27FC236}">
+                      <a16:creationId xmlns:a16="http://schemas.microsoft.com/office/drawing/2014/main" id="{E7D17A71-6C84-BF09-4186-3CDB33047401}"/>
+                    </a:ext>
+                  </a:extLst>
+                </p:cNvPr>
+                <p:cNvSpPr txBox="1"/>
+                <p:nvPr/>
+              </p:nvSpPr>
+              <p:spPr>
+                <a:xfrm>
+                  <a:off x="9955530" y="5014088"/>
+                  <a:ext cx="534971" cy="477137"/>
+                </a:xfrm>
+                <a:prstGeom prst="rect">
+                  <a:avLst/>
+                </a:prstGeom>
+                <a:noFill/>
+              </p:spPr>
+              <p:txBody>
+                <a:bodyPr wrap="square">
+                  <a:spAutoFit/>
+                </a:bodyPr>
+                <a:lstStyle/>
+                <a:p>
+                  <a:pPr/>
+                  <a14:m>
+                    <m:oMathPara xmlns:m="http://schemas.openxmlformats.org/officeDocument/2006/math">
+                      <m:oMathParaPr>
+                        <m:jc m:val="centerGroup"/>
+                      </m:oMathParaPr>
+                      <m:oMath xmlns:m="http://schemas.openxmlformats.org/officeDocument/2006/math">
+                        <m:r>
+                          <a:rPr lang="en-US" altLang="zh-TW" sz="2000" b="0" i="1" smtClean="0">
+                            <a:latin typeface="Cambria Math" panose="02040503050406030204" pitchFamily="18" charset="0"/>
+                          </a:rPr>
+                          <m:t>𝑊</m:t>
+                        </m:r>
+                      </m:oMath>
+                    </m:oMathPara>
+                  </a14:m>
+                  <a:endParaRPr lang="zh-TW" altLang="en-US" sz="2000" dirty="0"/>
+                </a:p>
+              </p:txBody>
+            </p:sp>
+          </mc:Choice>
+          <mc:Fallback>
+            <p:sp>
+              <p:nvSpPr>
+                <p:cNvPr id="47" name="文字方塊 46">
+                  <a:extLst>
+                    <a:ext uri="{FF2B5EF4-FFF2-40B4-BE49-F238E27FC236}">
+                      <a16:creationId xmlns:a16="http://schemas.microsoft.com/office/drawing/2014/main" id="{E7D17A71-6C84-BF09-4186-3CDB33047401}"/>
+                    </a:ext>
+                  </a:extLst>
+                </p:cNvPr>
+                <p:cNvSpPr txBox="1">
+                  <a:spLocks noRot="1" noChangeAspect="1" noMove="1" noResize="1" noEditPoints="1" noAdjustHandles="1" noChangeArrowheads="1" noChangeShapeType="1" noTextEdit="1"/>
+                </p:cNvSpPr>
+                <p:nvPr/>
+              </p:nvSpPr>
+              <p:spPr>
+                <a:xfrm>
+                  <a:off x="9955530" y="5014088"/>
+                  <a:ext cx="534971" cy="477137"/>
+                </a:xfrm>
+                <a:prstGeom prst="rect">
+                  <a:avLst/>
+                </a:prstGeom>
+                <a:blipFill>
+                  <a:blip r:embed="rId26"/>
+                  <a:stretch>
+                    <a:fillRect/>
+                  </a:stretch>
+                </a:blipFill>
+              </p:spPr>
+              <p:txBody>
+                <a:bodyPr/>
+                <a:lstStyle/>
+                <a:p>
+                  <a:r>
+                    <a:rPr lang="zh-TW" altLang="en-US">
+                      <a:noFill/>
+                    </a:rPr>
+                    <a:t> </a:t>
+                  </a:r>
+                </a:p>
+              </p:txBody>
+            </p:sp>
+          </mc:Fallback>
+        </mc:AlternateContent>
+        <p:grpSp>
+          <p:nvGrpSpPr>
+            <p:cNvPr id="50" name="群組 49">
+              <a:extLst>
+                <a:ext uri="{FF2B5EF4-FFF2-40B4-BE49-F238E27FC236}">
+                  <a16:creationId xmlns:a16="http://schemas.microsoft.com/office/drawing/2014/main" id="{DA042B52-9C49-BAD5-2666-C6DF86C56C0C}"/>
+                </a:ext>
+              </a:extLst>
+            </p:cNvPr>
+            <p:cNvGrpSpPr/>
+            <p:nvPr/>
+          </p:nvGrpSpPr>
+          <p:grpSpPr>
+            <a:xfrm>
+              <a:off x="9228841" y="3745742"/>
+              <a:ext cx="895546" cy="490194"/>
+              <a:chOff x="7654565" y="5128181"/>
+              <a:chExt cx="895546" cy="490194"/>
+            </a:xfrm>
+          </p:grpSpPr>
+          <p:sp>
+            <p:nvSpPr>
+              <p:cNvPr id="53" name="圓角矩形 52">
+                <a:extLst>
+                  <a:ext uri="{FF2B5EF4-FFF2-40B4-BE49-F238E27FC236}">
+                    <a16:creationId xmlns:a16="http://schemas.microsoft.com/office/drawing/2014/main" id="{D94076A1-BD24-9208-2D8B-FF1A81DAE770}"/>
+                  </a:ext>
+                </a:extLst>
+              </p:cNvPr>
+              <p:cNvSpPr/>
+              <p:nvPr/>
+            </p:nvSpPr>
+            <p:spPr>
+              <a:xfrm>
+                <a:off x="7654565" y="5128181"/>
+                <a:ext cx="895546" cy="490194"/>
+              </a:xfrm>
+              <a:prstGeom prst="roundRect">
+                <a:avLst/>
+              </a:prstGeom>
+              <a:solidFill>
+                <a:schemeClr val="accent2">
+                  <a:lumMod val="20000"/>
+                  <a:lumOff val="80000"/>
+                </a:schemeClr>
+              </a:solidFill>
+              <a:ln>
+                <a:solidFill>
+                  <a:schemeClr val="accent2"/>
+                </a:solidFill>
+              </a:ln>
+            </p:spPr>
+            <p:style>
+              <a:lnRef idx="2">
+                <a:schemeClr val="accent1">
+                  <a:shade val="50000"/>
+                </a:schemeClr>
+              </a:lnRef>
+              <a:fillRef idx="1">
+                <a:schemeClr val="accent1"/>
+              </a:fillRef>
+              <a:effectRef idx="0">
+                <a:schemeClr val="accent1"/>
+              </a:effectRef>
+              <a:fontRef idx="minor">
+                <a:schemeClr val="lt1"/>
+              </a:fontRef>
+            </p:style>
+            <p:txBody>
+              <a:bodyPr rtlCol="0" anchor="ctr"/>
+              <a:lstStyle/>
+              <a:p>
+                <a:pPr algn="ctr"/>
+                <a:endParaRPr kumimoji="1" lang="zh-TW" altLang="en-US"/>
+              </a:p>
+            </p:txBody>
+          </p:sp>
+          <mc:AlternateContent xmlns:mc="http://schemas.openxmlformats.org/markup-compatibility/2006" xmlns:a14="http://schemas.microsoft.com/office/drawing/2010/main">
+            <mc:Choice Requires="a14">
+              <p:sp>
+                <p:nvSpPr>
+                  <p:cNvPr id="54" name="文字方塊 53">
+                    <a:extLst>
+                      <a:ext uri="{FF2B5EF4-FFF2-40B4-BE49-F238E27FC236}">
+                        <a16:creationId xmlns:a16="http://schemas.microsoft.com/office/drawing/2014/main" id="{638ADBC1-5C35-B47B-F322-331544A8C033}"/>
+                      </a:ext>
+                    </a:extLst>
+                  </p:cNvPr>
+                  <p:cNvSpPr txBox="1"/>
+                  <p:nvPr/>
+                </p:nvSpPr>
+                <p:spPr>
+                  <a:xfrm>
+                    <a:off x="7768865" y="5173223"/>
+                    <a:ext cx="666946" cy="400110"/>
+                  </a:xfrm>
+                  <a:prstGeom prst="rect">
+                    <a:avLst/>
+                  </a:prstGeom>
+                  <a:noFill/>
+                </p:spPr>
+                <p:txBody>
+                  <a:bodyPr wrap="square">
+                    <a:spAutoFit/>
+                  </a:bodyPr>
+                  <a:lstStyle/>
+                  <a:p>
+                    <a:pPr/>
+                    <a14:m>
+                      <m:oMathPara xmlns:m="http://schemas.openxmlformats.org/officeDocument/2006/math">
+                        <m:oMathParaPr>
+                          <m:jc m:val="centerGroup"/>
+                        </m:oMathParaPr>
+                        <m:oMath xmlns:m="http://schemas.openxmlformats.org/officeDocument/2006/math">
+                          <m:sSub>
+                            <m:sSubPr>
+                              <m:ctrlPr>
+                                <a:rPr lang="zh-TW" altLang="en-US" sz="2000" i="1" smtClean="0">
+                                  <a:solidFill>
+                                    <a:schemeClr val="tx1"/>
+                                  </a:solidFill>
+                                  <a:latin typeface="Cambria Math" panose="02040503050406030204" pitchFamily="18" charset="0"/>
+                                </a:rPr>
+                              </m:ctrlPr>
+                            </m:sSubPr>
+                            <m:e>
+                              <m:r>
+                                <a:rPr lang="en-US" altLang="zh-TW" sz="2000" b="0" i="1" smtClean="0">
+                                  <a:solidFill>
+                                    <a:schemeClr val="tx1"/>
+                                  </a:solidFill>
+                                  <a:latin typeface="Cambria Math" panose="02040503050406030204" pitchFamily="18" charset="0"/>
+                                </a:rPr>
+                                <m:t>h</m:t>
+                              </m:r>
+                            </m:e>
+                            <m:sub>
+                              <m:r>
+                                <a:rPr lang="zh-TW" altLang="en-US" sz="2000" i="1">
+                                  <a:solidFill>
+                                    <a:schemeClr val="tx1"/>
+                                  </a:solidFill>
+                                  <a:latin typeface="Cambria Math" panose="02040503050406030204" pitchFamily="18" charset="0"/>
+                                </a:rPr>
+                                <m:t>𝑡</m:t>
+                              </m:r>
+                            </m:sub>
+                          </m:sSub>
+                        </m:oMath>
+                      </m:oMathPara>
+                    </a14:m>
+                    <a:endParaRPr lang="zh-TW" altLang="en-US" sz="2000" dirty="0">
+                      <a:solidFill>
+                        <a:schemeClr val="tx1"/>
+                      </a:solidFill>
+                    </a:endParaRPr>
+                  </a:p>
+                </p:txBody>
+              </p:sp>
+            </mc:Choice>
+            <mc:Fallback xmlns="">
+              <p:sp>
+                <p:nvSpPr>
+                  <p:cNvPr id="23" name="文字方塊 22">
+                    <a:extLst>
+                      <a:ext uri="{FF2B5EF4-FFF2-40B4-BE49-F238E27FC236}">
+                        <a16:creationId xmlns:a16="http://schemas.microsoft.com/office/drawing/2014/main" id="{98142BF9-B217-9B3A-89B9-6761B9CADD20}"/>
+                      </a:ext>
+                    </a:extLst>
+                  </p:cNvPr>
+                  <p:cNvSpPr txBox="1">
+                    <a:spLocks noRot="1" noChangeAspect="1" noMove="1" noResize="1" noEditPoints="1" noAdjustHandles="1" noChangeArrowheads="1" noChangeShapeType="1" noTextEdit="1"/>
+                  </p:cNvSpPr>
+                  <p:nvPr/>
+                </p:nvSpPr>
+                <p:spPr>
+                  <a:xfrm>
+                    <a:off x="7768865" y="5173223"/>
+                    <a:ext cx="666946" cy="400110"/>
+                  </a:xfrm>
+                  <a:prstGeom prst="rect">
+                    <a:avLst/>
+                  </a:prstGeom>
+                  <a:blipFill>
+                    <a:blip r:embed="rId27"/>
+                    <a:stretch>
+                      <a:fillRect/>
+                    </a:stretch>
+                  </a:blipFill>
+                </p:spPr>
+                <p:txBody>
+                  <a:bodyPr/>
+                  <a:lstStyle/>
+                  <a:p>
+                    <a:r>
+                      <a:rPr lang="zh-TW" altLang="en-US">
+                        <a:noFill/>
+                      </a:rPr>
+                      <a:t> </a:t>
+                    </a:r>
+                  </a:p>
+                </p:txBody>
+              </p:sp>
+            </mc:Fallback>
+          </mc:AlternateContent>
+        </p:grpSp>
+        <p:sp>
+          <p:nvSpPr>
+            <p:cNvPr id="55" name="文字方塊 54">
+              <a:extLst>
+                <a:ext uri="{FF2B5EF4-FFF2-40B4-BE49-F238E27FC236}">
+                  <a16:creationId xmlns:a16="http://schemas.microsoft.com/office/drawing/2014/main" id="{CB096A02-77AC-5EF0-D888-905EECF9C925}"/>
+                </a:ext>
+              </a:extLst>
+            </p:cNvPr>
+            <p:cNvSpPr txBox="1"/>
+            <p:nvPr/>
+          </p:nvSpPr>
+          <p:spPr>
+            <a:xfrm>
+              <a:off x="9514355" y="4250505"/>
+              <a:ext cx="358218" cy="461665"/>
+            </a:xfrm>
+            <a:prstGeom prst="rect">
+              <a:avLst/>
+            </a:prstGeom>
+            <a:noFill/>
+          </p:spPr>
+          <p:txBody>
+            <a:bodyPr wrap="square" rtlCol="0" anchor="ctr">
+              <a:spAutoFit/>
+            </a:bodyPr>
+            <a:lstStyle/>
+            <a:p>
+              <a:r>
+                <a:rPr kumimoji="1" lang="en-US" altLang="zh-TW" sz="2400" dirty="0"/>
+                <a:t>+</a:t>
+              </a:r>
+              <a:endParaRPr kumimoji="1" lang="zh-TW" altLang="en-US" sz="2400" dirty="0"/>
+            </a:p>
+          </p:txBody>
+        </p:sp>
+        <p:sp>
+          <p:nvSpPr>
+            <p:cNvPr id="56" name="不規則四邊形 55">
+              <a:extLst>
+                <a:ext uri="{FF2B5EF4-FFF2-40B4-BE49-F238E27FC236}">
+                  <a16:creationId xmlns:a16="http://schemas.microsoft.com/office/drawing/2014/main" id="{310E0187-45A9-D32F-D89B-A2A1D82BDB0C}"/>
+                </a:ext>
+              </a:extLst>
+            </p:cNvPr>
+            <p:cNvSpPr/>
+            <p:nvPr/>
+          </p:nvSpPr>
+          <p:spPr>
+            <a:xfrm flipV="1">
+              <a:off x="9364093" y="2429840"/>
+              <a:ext cx="591437" cy="1219078"/>
+            </a:xfrm>
+            <a:prstGeom prst="trapezoid">
+              <a:avLst/>
+            </a:prstGeom>
+            <a:solidFill>
+              <a:schemeClr val="bg1">
+                <a:lumMod val="85000"/>
+              </a:schemeClr>
+            </a:solidFill>
+            <a:ln>
+              <a:noFill/>
+            </a:ln>
+          </p:spPr>
+          <p:style>
+            <a:lnRef idx="2">
+              <a:schemeClr val="accent1">
+                <a:shade val="50000"/>
+              </a:schemeClr>
+            </a:lnRef>
+            <a:fillRef idx="1">
+              <a:schemeClr val="accent1"/>
+            </a:fillRef>
+            <a:effectRef idx="0">
+              <a:schemeClr val="accent1"/>
+            </a:effectRef>
+            <a:fontRef idx="minor">
+              <a:schemeClr val="lt1"/>
+            </a:fontRef>
+          </p:style>
+          <p:txBody>
+            <a:bodyPr rtlCol="0" anchor="ctr"/>
+            <a:lstStyle/>
+            <a:p>
+              <a:pPr algn="ctr"/>
+              <a:endParaRPr kumimoji="1" lang="zh-TW" altLang="en-US"/>
+            </a:p>
+          </p:txBody>
+        </p:sp>
+        <mc:AlternateContent xmlns:mc="http://schemas.openxmlformats.org/markup-compatibility/2006">
+          <mc:Choice xmlns:a14="http://schemas.microsoft.com/office/drawing/2010/main" Requires="a14">
+            <p:sp>
+              <p:nvSpPr>
+                <p:cNvPr id="57" name="文字方塊 56">
+                  <a:extLst>
+                    <a:ext uri="{FF2B5EF4-FFF2-40B4-BE49-F238E27FC236}">
+                      <a16:creationId xmlns:a16="http://schemas.microsoft.com/office/drawing/2014/main" id="{E066AEAF-6A9E-D66F-C898-1532E2A11B1C}"/>
+                    </a:ext>
+                  </a:extLst>
+                </p:cNvPr>
+                <p:cNvSpPr txBox="1"/>
+                <p:nvPr/>
+              </p:nvSpPr>
+              <p:spPr>
+                <a:xfrm>
+                  <a:off x="9404473" y="2854713"/>
+                  <a:ext cx="534971" cy="400110"/>
+                </a:xfrm>
+                <a:prstGeom prst="rect">
+                  <a:avLst/>
+                </a:prstGeom>
+                <a:noFill/>
+              </p:spPr>
+              <p:txBody>
+                <a:bodyPr wrap="square">
+                  <a:spAutoFit/>
+                </a:bodyPr>
+                <a:lstStyle/>
+                <a:p>
+                  <a:pPr/>
+                  <a14:m>
+                    <m:oMathPara xmlns:m="http://schemas.openxmlformats.org/officeDocument/2006/math">
+                      <m:oMathParaPr>
+                        <m:jc m:val="centerGroup"/>
+                      </m:oMathParaPr>
+                      <m:oMath xmlns:m="http://schemas.openxmlformats.org/officeDocument/2006/math">
+                        <m:r>
+                          <a:rPr lang="en-US" altLang="zh-TW" sz="2000" b="0" i="1" smtClean="0">
+                            <a:latin typeface="Cambria Math" panose="02040503050406030204" pitchFamily="18" charset="0"/>
+                          </a:rPr>
+                          <m:t>𝑉</m:t>
+                        </m:r>
+                      </m:oMath>
+                    </m:oMathPara>
+                  </a14:m>
+                  <a:endParaRPr lang="zh-TW" altLang="en-US" sz="2000" dirty="0"/>
+                </a:p>
+              </p:txBody>
+            </p:sp>
+          </mc:Choice>
+          <mc:Fallback>
+            <p:sp>
+              <p:nvSpPr>
+                <p:cNvPr id="57" name="文字方塊 56">
+                  <a:extLst>
+                    <a:ext uri="{FF2B5EF4-FFF2-40B4-BE49-F238E27FC236}">
+                      <a16:creationId xmlns:a16="http://schemas.microsoft.com/office/drawing/2014/main" id="{E066AEAF-6A9E-D66F-C898-1532E2A11B1C}"/>
+                    </a:ext>
+                  </a:extLst>
+                </p:cNvPr>
+                <p:cNvSpPr txBox="1">
+                  <a:spLocks noRot="1" noChangeAspect="1" noMove="1" noResize="1" noEditPoints="1" noAdjustHandles="1" noChangeArrowheads="1" noChangeShapeType="1" noTextEdit="1"/>
+                </p:cNvSpPr>
+                <p:nvPr/>
+              </p:nvSpPr>
+              <p:spPr>
+                <a:xfrm>
+                  <a:off x="9404473" y="2854713"/>
+                  <a:ext cx="534971" cy="400110"/>
+                </a:xfrm>
+                <a:prstGeom prst="rect">
+                  <a:avLst/>
+                </a:prstGeom>
+                <a:blipFill>
+                  <a:blip r:embed="rId28"/>
+                  <a:stretch>
+                    <a:fillRect b="-10714"/>
+                  </a:stretch>
+                </a:blipFill>
+              </p:spPr>
+              <p:txBody>
+                <a:bodyPr/>
+                <a:lstStyle/>
+                <a:p>
+                  <a:r>
+                    <a:rPr lang="zh-TW" altLang="en-US">
+                      <a:noFill/>
+                    </a:rPr>
+                    <a:t> </a:t>
+                  </a:r>
+                </a:p>
+              </p:txBody>
+            </p:sp>
+          </mc:Fallback>
+        </mc:AlternateContent>
+        <p:grpSp>
+          <p:nvGrpSpPr>
+            <p:cNvPr id="58" name="群組 57">
+              <a:extLst>
+                <a:ext uri="{FF2B5EF4-FFF2-40B4-BE49-F238E27FC236}">
+                  <a16:creationId xmlns:a16="http://schemas.microsoft.com/office/drawing/2014/main" id="{8E54B37F-E80F-C544-569B-B8E600AB6423}"/>
+                </a:ext>
+              </a:extLst>
+            </p:cNvPr>
+            <p:cNvGrpSpPr/>
+            <p:nvPr/>
+          </p:nvGrpSpPr>
+          <p:grpSpPr>
+            <a:xfrm>
+              <a:off x="9212038" y="1829776"/>
+              <a:ext cx="895546" cy="490194"/>
+              <a:chOff x="7654565" y="5128181"/>
+              <a:chExt cx="895546" cy="490194"/>
+            </a:xfrm>
+          </p:grpSpPr>
+          <p:sp>
+            <p:nvSpPr>
+              <p:cNvPr id="59" name="圓角矩形 58">
+                <a:extLst>
+                  <a:ext uri="{FF2B5EF4-FFF2-40B4-BE49-F238E27FC236}">
+                    <a16:creationId xmlns:a16="http://schemas.microsoft.com/office/drawing/2014/main" id="{DA1D6A81-121F-1601-C7C3-0B2CFF9117B4}"/>
+                  </a:ext>
+                </a:extLst>
+              </p:cNvPr>
+              <p:cNvSpPr/>
+              <p:nvPr/>
+            </p:nvSpPr>
+            <p:spPr>
+              <a:xfrm>
+                <a:off x="7654565" y="5128181"/>
+                <a:ext cx="895546" cy="490194"/>
+              </a:xfrm>
+              <a:prstGeom prst="roundRect">
+                <a:avLst/>
+              </a:prstGeom>
+              <a:solidFill>
+                <a:schemeClr val="accent2">
+                  <a:lumMod val="20000"/>
+                  <a:lumOff val="80000"/>
+                </a:schemeClr>
+              </a:solidFill>
+              <a:ln>
+                <a:solidFill>
+                  <a:schemeClr val="accent2"/>
+                </a:solidFill>
+              </a:ln>
+            </p:spPr>
+            <p:style>
+              <a:lnRef idx="2">
+                <a:schemeClr val="accent1">
+                  <a:shade val="50000"/>
+                </a:schemeClr>
+              </a:lnRef>
+              <a:fillRef idx="1">
+                <a:schemeClr val="accent1"/>
+              </a:fillRef>
+              <a:effectRef idx="0">
+                <a:schemeClr val="accent1"/>
+              </a:effectRef>
+              <a:fontRef idx="minor">
+                <a:schemeClr val="lt1"/>
+              </a:fontRef>
+            </p:style>
+            <p:txBody>
+              <a:bodyPr rtlCol="0" anchor="ctr"/>
+              <a:lstStyle/>
+              <a:p>
+                <a:pPr algn="ctr"/>
+                <a:endParaRPr kumimoji="1" lang="zh-TW" altLang="en-US"/>
+              </a:p>
+            </p:txBody>
+          </p:sp>
+          <mc:AlternateContent xmlns:mc="http://schemas.openxmlformats.org/markup-compatibility/2006" xmlns:a14="http://schemas.microsoft.com/office/drawing/2010/main">
+            <mc:Choice Requires="a14">
+              <p:sp>
+                <p:nvSpPr>
+                  <p:cNvPr id="60" name="文字方塊 59">
+                    <a:extLst>
+                      <a:ext uri="{FF2B5EF4-FFF2-40B4-BE49-F238E27FC236}">
+                        <a16:creationId xmlns:a16="http://schemas.microsoft.com/office/drawing/2014/main" id="{6E81EB5E-D1FA-34DF-0620-74B599446A96}"/>
+                      </a:ext>
+                    </a:extLst>
+                  </p:cNvPr>
+                  <p:cNvSpPr txBox="1"/>
+                  <p:nvPr/>
+                </p:nvSpPr>
+                <p:spPr>
+                  <a:xfrm>
+                    <a:off x="7768865" y="5173223"/>
+                    <a:ext cx="666946" cy="400110"/>
+                  </a:xfrm>
+                  <a:prstGeom prst="rect">
+                    <a:avLst/>
+                  </a:prstGeom>
+                  <a:noFill/>
+                </p:spPr>
+                <p:txBody>
+                  <a:bodyPr wrap="square">
+                    <a:spAutoFit/>
+                  </a:bodyPr>
+                  <a:lstStyle/>
+                  <a:p>
+                    <a:pPr/>
+                    <a14:m>
+                      <m:oMathPara xmlns:m="http://schemas.openxmlformats.org/officeDocument/2006/math">
+                        <m:oMathParaPr>
+                          <m:jc m:val="centerGroup"/>
+                        </m:oMathParaPr>
+                        <m:oMath xmlns:m="http://schemas.openxmlformats.org/officeDocument/2006/math">
+                          <m:sSub>
+                            <m:sSubPr>
+                              <m:ctrlPr>
+                                <a:rPr lang="zh-TW" altLang="en-US" sz="2000" i="1" smtClean="0">
+                                  <a:solidFill>
+                                    <a:schemeClr val="tx1"/>
+                                  </a:solidFill>
+                                  <a:latin typeface="Cambria Math" panose="02040503050406030204" pitchFamily="18" charset="0"/>
+                                </a:rPr>
+                              </m:ctrlPr>
+                            </m:sSubPr>
+                            <m:e>
+                              <m:r>
+                                <a:rPr lang="en-US" altLang="zh-TW" sz="2000" b="0" i="1" smtClean="0">
+                                  <a:solidFill>
+                                    <a:schemeClr val="tx1"/>
+                                  </a:solidFill>
+                                  <a:latin typeface="Cambria Math" panose="02040503050406030204" pitchFamily="18" charset="0"/>
+                                </a:rPr>
+                                <m:t>𝑦</m:t>
+                              </m:r>
+                            </m:e>
+                            <m:sub>
+                              <m:r>
+                                <a:rPr lang="zh-TW" altLang="en-US" sz="2000" i="1">
+                                  <a:solidFill>
+                                    <a:schemeClr val="tx1"/>
+                                  </a:solidFill>
+                                  <a:latin typeface="Cambria Math" panose="02040503050406030204" pitchFamily="18" charset="0"/>
+                                </a:rPr>
+                                <m:t>𝑡</m:t>
+                              </m:r>
+                            </m:sub>
+                          </m:sSub>
+                        </m:oMath>
+                      </m:oMathPara>
+                    </a14:m>
+                    <a:endParaRPr lang="zh-TW" altLang="en-US" sz="2000" dirty="0">
+                      <a:solidFill>
+                        <a:schemeClr val="tx1"/>
+                      </a:solidFill>
+                    </a:endParaRPr>
+                  </a:p>
+                </p:txBody>
+              </p:sp>
+            </mc:Choice>
+            <mc:Fallback xmlns="">
+              <p:sp>
+                <p:nvSpPr>
+                  <p:cNvPr id="29" name="文字方塊 28">
+                    <a:extLst>
+                      <a:ext uri="{FF2B5EF4-FFF2-40B4-BE49-F238E27FC236}">
+                        <a16:creationId xmlns:a16="http://schemas.microsoft.com/office/drawing/2014/main" id="{10CF887D-6BA7-4674-B095-B5205D3938A9}"/>
+                      </a:ext>
+                    </a:extLst>
+                  </p:cNvPr>
+                  <p:cNvSpPr txBox="1">
+                    <a:spLocks noRot="1" noChangeAspect="1" noMove="1" noResize="1" noEditPoints="1" noAdjustHandles="1" noChangeArrowheads="1" noChangeShapeType="1" noTextEdit="1"/>
+                  </p:cNvSpPr>
+                  <p:nvPr/>
+                </p:nvSpPr>
+                <p:spPr>
+                  <a:xfrm>
+                    <a:off x="7768865" y="5173223"/>
+                    <a:ext cx="666946" cy="400110"/>
+                  </a:xfrm>
+                  <a:prstGeom prst="rect">
+                    <a:avLst/>
+                  </a:prstGeom>
+                  <a:blipFill>
+                    <a:blip r:embed="rId29"/>
+                    <a:stretch>
+                      <a:fillRect b="-3030"/>
+                    </a:stretch>
+                  </a:blipFill>
+                </p:spPr>
+                <p:txBody>
+                  <a:bodyPr/>
+                  <a:lstStyle/>
+                  <a:p>
+                    <a:r>
+                      <a:rPr lang="zh-TW" altLang="en-US">
+                        <a:noFill/>
+                      </a:rPr>
+                      <a:t> </a:t>
+                    </a:r>
+                  </a:p>
+                </p:txBody>
+              </p:sp>
+            </mc:Fallback>
+          </mc:AlternateContent>
+        </p:grpSp>
+      </p:grpSp>
     </p:spTree>
     <p:extLst>
       <p:ext uri="{BB962C8B-B14F-4D97-AF65-F5344CB8AC3E}">
@@ -36382,6 +37990,1160 @@
   <p:clrMapOvr>
     <a:masterClrMapping/>
   </p:clrMapOvr>
+  <p:timing>
+    <p:tnLst>
+      <p:par>
+        <p:cTn id="1" dur="indefinite" restart="never" nodeType="tmRoot">
+          <p:childTnLst>
+            <p:seq concurrent="1" nextAc="seek">
+              <p:cTn id="2" dur="indefinite" nodeType="mainSeq">
+                <p:childTnLst>
+                  <p:par>
+                    <p:cTn id="3" fill="hold">
+                      <p:stCondLst>
+                        <p:cond delay="indefinite"/>
+                      </p:stCondLst>
+                      <p:childTnLst>
+                        <p:par>
+                          <p:cTn id="4" fill="hold">
+                            <p:stCondLst>
+                              <p:cond delay="0"/>
+                            </p:stCondLst>
+                            <p:childTnLst>
+                              <p:par>
+                                <p:cTn id="5" presetID="1" presetClass="entr" presetSubtype="0" fill="hold" nodeType="clickEffect">
+                                  <p:stCondLst>
+                                    <p:cond delay="0"/>
+                                  </p:stCondLst>
+                                  <p:childTnLst>
+                                    <p:set>
+                                      <p:cBhvr>
+                                        <p:cTn id="6" dur="1" fill="hold">
+                                          <p:stCondLst>
+                                            <p:cond delay="0"/>
+                                          </p:stCondLst>
+                                        </p:cTn>
+                                        <p:tgtEl>
+                                          <p:spTgt spid="12"/>
+                                        </p:tgtEl>
+                                        <p:attrNameLst>
+                                          <p:attrName>style.visibility</p:attrName>
+                                        </p:attrNameLst>
+                                      </p:cBhvr>
+                                      <p:to>
+                                        <p:strVal val="visible"/>
+                                      </p:to>
+                                    </p:set>
+                                  </p:childTnLst>
+                                </p:cTn>
+                              </p:par>
+                              <p:par>
+                                <p:cTn id="7" presetID="1" presetClass="entr" presetSubtype="0" fill="hold" nodeType="withEffect">
+                                  <p:stCondLst>
+                                    <p:cond delay="0"/>
+                                  </p:stCondLst>
+                                  <p:childTnLst>
+                                    <p:set>
+                                      <p:cBhvr>
+                                        <p:cTn id="8" dur="1" fill="hold">
+                                          <p:stCondLst>
+                                            <p:cond delay="0"/>
+                                          </p:stCondLst>
+                                        </p:cTn>
+                                        <p:tgtEl>
+                                          <p:spTgt spid="13"/>
+                                        </p:tgtEl>
+                                        <p:attrNameLst>
+                                          <p:attrName>style.visibility</p:attrName>
+                                        </p:attrNameLst>
+                                      </p:cBhvr>
+                                      <p:to>
+                                        <p:strVal val="visible"/>
+                                      </p:to>
+                                    </p:set>
+                                  </p:childTnLst>
+                                </p:cTn>
+                              </p:par>
+                              <p:par>
+                                <p:cTn id="9" presetID="1" presetClass="entr" presetSubtype="0" fill="hold" grpId="0" nodeType="withEffect">
+                                  <p:stCondLst>
+                                    <p:cond delay="0"/>
+                                  </p:stCondLst>
+                                  <p:childTnLst>
+                                    <p:set>
+                                      <p:cBhvr>
+                                        <p:cTn id="10" dur="1" fill="hold">
+                                          <p:stCondLst>
+                                            <p:cond delay="0"/>
+                                          </p:stCondLst>
+                                        </p:cTn>
+                                        <p:tgtEl>
+                                          <p:spTgt spid="16"/>
+                                        </p:tgtEl>
+                                        <p:attrNameLst>
+                                          <p:attrName>style.visibility</p:attrName>
+                                        </p:attrNameLst>
+                                      </p:cBhvr>
+                                      <p:to>
+                                        <p:strVal val="visible"/>
+                                      </p:to>
+                                    </p:set>
+                                  </p:childTnLst>
+                                </p:cTn>
+                              </p:par>
+                              <p:par>
+                                <p:cTn id="11" presetID="1" presetClass="entr" presetSubtype="0" fill="hold" grpId="0" nodeType="withEffect">
+                                  <p:stCondLst>
+                                    <p:cond delay="0"/>
+                                  </p:stCondLst>
+                                  <p:childTnLst>
+                                    <p:set>
+                                      <p:cBhvr>
+                                        <p:cTn id="12" dur="1" fill="hold">
+                                          <p:stCondLst>
+                                            <p:cond delay="0"/>
+                                          </p:stCondLst>
+                                        </p:cTn>
+                                        <p:tgtEl>
+                                          <p:spTgt spid="17"/>
+                                        </p:tgtEl>
+                                        <p:attrNameLst>
+                                          <p:attrName>style.visibility</p:attrName>
+                                        </p:attrNameLst>
+                                      </p:cBhvr>
+                                      <p:to>
+                                        <p:strVal val="visible"/>
+                                      </p:to>
+                                    </p:set>
+                                  </p:childTnLst>
+                                </p:cTn>
+                              </p:par>
+                              <p:par>
+                                <p:cTn id="13" presetID="1" presetClass="entr" presetSubtype="0" fill="hold" grpId="0" nodeType="withEffect">
+                                  <p:stCondLst>
+                                    <p:cond delay="0"/>
+                                  </p:stCondLst>
+                                  <p:childTnLst>
+                                    <p:set>
+                                      <p:cBhvr>
+                                        <p:cTn id="14" dur="1" fill="hold">
+                                          <p:stCondLst>
+                                            <p:cond delay="0"/>
+                                          </p:stCondLst>
+                                        </p:cTn>
+                                        <p:tgtEl>
+                                          <p:spTgt spid="19"/>
+                                        </p:tgtEl>
+                                        <p:attrNameLst>
+                                          <p:attrName>style.visibility</p:attrName>
+                                        </p:attrNameLst>
+                                      </p:cBhvr>
+                                      <p:to>
+                                        <p:strVal val="visible"/>
+                                      </p:to>
+                                    </p:set>
+                                  </p:childTnLst>
+                                </p:cTn>
+                              </p:par>
+                              <p:par>
+                                <p:cTn id="15" presetID="1" presetClass="entr" presetSubtype="0" fill="hold" grpId="0" nodeType="withEffect">
+                                  <p:stCondLst>
+                                    <p:cond delay="0"/>
+                                  </p:stCondLst>
+                                  <p:childTnLst>
+                                    <p:set>
+                                      <p:cBhvr>
+                                        <p:cTn id="16" dur="1" fill="hold">
+                                          <p:stCondLst>
+                                            <p:cond delay="0"/>
+                                          </p:stCondLst>
+                                        </p:cTn>
+                                        <p:tgtEl>
+                                          <p:spTgt spid="20"/>
+                                        </p:tgtEl>
+                                        <p:attrNameLst>
+                                          <p:attrName>style.visibility</p:attrName>
+                                        </p:attrNameLst>
+                                      </p:cBhvr>
+                                      <p:to>
+                                        <p:strVal val="visible"/>
+                                      </p:to>
+                                    </p:set>
+                                  </p:childTnLst>
+                                </p:cTn>
+                              </p:par>
+                              <p:par>
+                                <p:cTn id="17" presetID="1" presetClass="entr" presetSubtype="0" fill="hold" nodeType="withEffect">
+                                  <p:stCondLst>
+                                    <p:cond delay="0"/>
+                                  </p:stCondLst>
+                                  <p:childTnLst>
+                                    <p:set>
+                                      <p:cBhvr>
+                                        <p:cTn id="18" dur="1" fill="hold">
+                                          <p:stCondLst>
+                                            <p:cond delay="0"/>
+                                          </p:stCondLst>
+                                        </p:cTn>
+                                        <p:tgtEl>
+                                          <p:spTgt spid="18"/>
+                                        </p:tgtEl>
+                                        <p:attrNameLst>
+                                          <p:attrName>style.visibility</p:attrName>
+                                        </p:attrNameLst>
+                                      </p:cBhvr>
+                                      <p:to>
+                                        <p:strVal val="visible"/>
+                                      </p:to>
+                                    </p:set>
+                                  </p:childTnLst>
+                                </p:cTn>
+                              </p:par>
+                              <p:par>
+                                <p:cTn id="19" presetID="1" presetClass="entr" presetSubtype="0" fill="hold" nodeType="withEffect">
+                                  <p:stCondLst>
+                                    <p:cond delay="0"/>
+                                  </p:stCondLst>
+                                  <p:childTnLst>
+                                    <p:set>
+                                      <p:cBhvr>
+                                        <p:cTn id="20" dur="1" fill="hold">
+                                          <p:stCondLst>
+                                            <p:cond delay="0"/>
+                                          </p:stCondLst>
+                                        </p:cTn>
+                                        <p:tgtEl>
+                                          <p:spTgt spid="32"/>
+                                        </p:tgtEl>
+                                        <p:attrNameLst>
+                                          <p:attrName>style.visibility</p:attrName>
+                                        </p:attrNameLst>
+                                      </p:cBhvr>
+                                      <p:to>
+                                        <p:strVal val="visible"/>
+                                      </p:to>
+                                    </p:set>
+                                  </p:childTnLst>
+                                </p:cTn>
+                              </p:par>
+                              <p:par>
+                                <p:cTn id="21" presetID="1" presetClass="entr" presetSubtype="0" fill="hold" grpId="0" nodeType="withEffect">
+                                  <p:stCondLst>
+                                    <p:cond delay="0"/>
+                                  </p:stCondLst>
+                                  <p:childTnLst>
+                                    <p:set>
+                                      <p:cBhvr>
+                                        <p:cTn id="22" dur="1" fill="hold">
+                                          <p:stCondLst>
+                                            <p:cond delay="0"/>
+                                          </p:stCondLst>
+                                        </p:cTn>
+                                        <p:tgtEl>
+                                          <p:spTgt spid="35"/>
+                                        </p:tgtEl>
+                                        <p:attrNameLst>
+                                          <p:attrName>style.visibility</p:attrName>
+                                        </p:attrNameLst>
+                                      </p:cBhvr>
+                                      <p:to>
+                                        <p:strVal val="visible"/>
+                                      </p:to>
+                                    </p:set>
+                                  </p:childTnLst>
+                                </p:cTn>
+                              </p:par>
+                              <p:par>
+                                <p:cTn id="23" presetID="1" presetClass="entr" presetSubtype="0" fill="hold" grpId="0" nodeType="withEffect">
+                                  <p:stCondLst>
+                                    <p:cond delay="0"/>
+                                  </p:stCondLst>
+                                  <p:childTnLst>
+                                    <p:set>
+                                      <p:cBhvr>
+                                        <p:cTn id="24" dur="1" fill="hold">
+                                          <p:stCondLst>
+                                            <p:cond delay="0"/>
+                                          </p:stCondLst>
+                                        </p:cTn>
+                                        <p:tgtEl>
+                                          <p:spTgt spid="36"/>
+                                        </p:tgtEl>
+                                        <p:attrNameLst>
+                                          <p:attrName>style.visibility</p:attrName>
+                                        </p:attrNameLst>
+                                      </p:cBhvr>
+                                      <p:to>
+                                        <p:strVal val="visible"/>
+                                      </p:to>
+                                    </p:set>
+                                  </p:childTnLst>
+                                </p:cTn>
+                              </p:par>
+                              <p:par>
+                                <p:cTn id="25" presetID="1" presetClass="entr" presetSubtype="0" fill="hold" grpId="0" nodeType="withEffect">
+                                  <p:stCondLst>
+                                    <p:cond delay="0"/>
+                                  </p:stCondLst>
+                                  <p:childTnLst>
+                                    <p:set>
+                                      <p:cBhvr>
+                                        <p:cTn id="26" dur="1" fill="hold">
+                                          <p:stCondLst>
+                                            <p:cond delay="0"/>
+                                          </p:stCondLst>
+                                        </p:cTn>
+                                        <p:tgtEl>
+                                          <p:spTgt spid="37"/>
+                                        </p:tgtEl>
+                                        <p:attrNameLst>
+                                          <p:attrName>style.visibility</p:attrName>
+                                        </p:attrNameLst>
+                                      </p:cBhvr>
+                                      <p:to>
+                                        <p:strVal val="visible"/>
+                                      </p:to>
+                                    </p:set>
+                                  </p:childTnLst>
+                                </p:cTn>
+                              </p:par>
+                              <p:par>
+                                <p:cTn id="27" presetID="1" presetClass="entr" presetSubtype="0" fill="hold" grpId="0" nodeType="withEffect">
+                                  <p:stCondLst>
+                                    <p:cond delay="0"/>
+                                  </p:stCondLst>
+                                  <p:childTnLst>
+                                    <p:set>
+                                      <p:cBhvr>
+                                        <p:cTn id="28" dur="1" fill="hold">
+                                          <p:stCondLst>
+                                            <p:cond delay="0"/>
+                                          </p:stCondLst>
+                                        </p:cTn>
+                                        <p:tgtEl>
+                                          <p:spTgt spid="38"/>
+                                        </p:tgtEl>
+                                        <p:attrNameLst>
+                                          <p:attrName>style.visibility</p:attrName>
+                                        </p:attrNameLst>
+                                      </p:cBhvr>
+                                      <p:to>
+                                        <p:strVal val="visible"/>
+                                      </p:to>
+                                    </p:set>
+                                  </p:childTnLst>
+                                </p:cTn>
+                              </p:par>
+                              <p:par>
+                                <p:cTn id="29" presetID="1" presetClass="entr" presetSubtype="0" fill="hold" grpId="0" nodeType="withEffect">
+                                  <p:stCondLst>
+                                    <p:cond delay="0"/>
+                                  </p:stCondLst>
+                                  <p:childTnLst>
+                                    <p:set>
+                                      <p:cBhvr>
+                                        <p:cTn id="30" dur="1" fill="hold">
+                                          <p:stCondLst>
+                                            <p:cond delay="0"/>
+                                          </p:stCondLst>
+                                        </p:cTn>
+                                        <p:tgtEl>
+                                          <p:spTgt spid="50"/>
+                                        </p:tgtEl>
+                                        <p:attrNameLst>
+                                          <p:attrName>style.visibility</p:attrName>
+                                        </p:attrNameLst>
+                                      </p:cBhvr>
+                                      <p:to>
+                                        <p:strVal val="visible"/>
+                                      </p:to>
+                                    </p:set>
+                                  </p:childTnLst>
+                                </p:cTn>
+                              </p:par>
+                              <p:par>
+                                <p:cTn id="31" presetID="1" presetClass="entr" presetSubtype="0" fill="hold" grpId="0" nodeType="withEffect">
+                                  <p:stCondLst>
+                                    <p:cond delay="0"/>
+                                  </p:stCondLst>
+                                  <p:childTnLst>
+                                    <p:set>
+                                      <p:cBhvr>
+                                        <p:cTn id="32" dur="1" fill="hold">
+                                          <p:stCondLst>
+                                            <p:cond delay="0"/>
+                                          </p:stCondLst>
+                                        </p:cTn>
+                                        <p:tgtEl>
+                                          <p:spTgt spid="52"/>
+                                        </p:tgtEl>
+                                        <p:attrNameLst>
+                                          <p:attrName>style.visibility</p:attrName>
+                                        </p:attrNameLst>
+                                      </p:cBhvr>
+                                      <p:to>
+                                        <p:strVal val="visible"/>
+                                      </p:to>
+                                    </p:set>
+                                  </p:childTnLst>
+                                </p:cTn>
+                              </p:par>
+                              <p:par>
+                                <p:cTn id="33" presetID="1" presetClass="entr" presetSubtype="0" fill="hold" nodeType="withEffect">
+                                  <p:stCondLst>
+                                    <p:cond delay="0"/>
+                                  </p:stCondLst>
+                                  <p:childTnLst>
+                                    <p:set>
+                                      <p:cBhvr>
+                                        <p:cTn id="34" dur="1" fill="hold">
+                                          <p:stCondLst>
+                                            <p:cond delay="0"/>
+                                          </p:stCondLst>
+                                        </p:cTn>
+                                        <p:tgtEl>
+                                          <p:spTgt spid="53"/>
+                                        </p:tgtEl>
+                                        <p:attrNameLst>
+                                          <p:attrName>style.visibility</p:attrName>
+                                        </p:attrNameLst>
+                                      </p:cBhvr>
+                                      <p:to>
+                                        <p:strVal val="visible"/>
+                                      </p:to>
+                                    </p:set>
+                                  </p:childTnLst>
+                                </p:cTn>
+                              </p:par>
+                              <p:par>
+                                <p:cTn id="35" presetID="1" presetClass="entr" presetSubtype="0" fill="hold" nodeType="withEffect">
+                                  <p:stCondLst>
+                                    <p:cond delay="0"/>
+                                  </p:stCondLst>
+                                  <p:childTnLst>
+                                    <p:set>
+                                      <p:cBhvr>
+                                        <p:cTn id="36" dur="1" fill="hold">
+                                          <p:stCondLst>
+                                            <p:cond delay="0"/>
+                                          </p:stCondLst>
+                                        </p:cTn>
+                                        <p:tgtEl>
+                                          <p:spTgt spid="56"/>
+                                        </p:tgtEl>
+                                        <p:attrNameLst>
+                                          <p:attrName>style.visibility</p:attrName>
+                                        </p:attrNameLst>
+                                      </p:cBhvr>
+                                      <p:to>
+                                        <p:strVal val="visible"/>
+                                      </p:to>
+                                    </p:set>
+                                  </p:childTnLst>
+                                </p:cTn>
+                              </p:par>
+                              <p:par>
+                                <p:cTn id="37" presetID="1" presetClass="entr" presetSubtype="0" fill="hold" grpId="0" nodeType="withEffect">
+                                  <p:stCondLst>
+                                    <p:cond delay="0"/>
+                                  </p:stCondLst>
+                                  <p:childTnLst>
+                                    <p:set>
+                                      <p:cBhvr>
+                                        <p:cTn id="38" dur="1" fill="hold">
+                                          <p:stCondLst>
+                                            <p:cond delay="0"/>
+                                          </p:stCondLst>
+                                        </p:cTn>
+                                        <p:tgtEl>
+                                          <p:spTgt spid="59"/>
+                                        </p:tgtEl>
+                                        <p:attrNameLst>
+                                          <p:attrName>style.visibility</p:attrName>
+                                        </p:attrNameLst>
+                                      </p:cBhvr>
+                                      <p:to>
+                                        <p:strVal val="visible"/>
+                                      </p:to>
+                                    </p:set>
+                                  </p:childTnLst>
+                                </p:cTn>
+                              </p:par>
+                              <p:par>
+                                <p:cTn id="39" presetID="1" presetClass="entr" presetSubtype="0" fill="hold" grpId="0" nodeType="withEffect">
+                                  <p:stCondLst>
+                                    <p:cond delay="0"/>
+                                  </p:stCondLst>
+                                  <p:childTnLst>
+                                    <p:set>
+                                      <p:cBhvr>
+                                        <p:cTn id="40" dur="1" fill="hold">
+                                          <p:stCondLst>
+                                            <p:cond delay="0"/>
+                                          </p:stCondLst>
+                                        </p:cTn>
+                                        <p:tgtEl>
+                                          <p:spTgt spid="60"/>
+                                        </p:tgtEl>
+                                        <p:attrNameLst>
+                                          <p:attrName>style.visibility</p:attrName>
+                                        </p:attrNameLst>
+                                      </p:cBhvr>
+                                      <p:to>
+                                        <p:strVal val="visible"/>
+                                      </p:to>
+                                    </p:set>
+                                  </p:childTnLst>
+                                </p:cTn>
+                              </p:par>
+                              <p:par>
+                                <p:cTn id="41" presetID="1" presetClass="entr" presetSubtype="0" fill="hold" grpId="0" nodeType="withEffect">
+                                  <p:stCondLst>
+                                    <p:cond delay="0"/>
+                                  </p:stCondLst>
+                                  <p:childTnLst>
+                                    <p:set>
+                                      <p:cBhvr>
+                                        <p:cTn id="42" dur="1" fill="hold">
+                                          <p:stCondLst>
+                                            <p:cond delay="0"/>
+                                          </p:stCondLst>
+                                        </p:cTn>
+                                        <p:tgtEl>
+                                          <p:spTgt spid="61"/>
+                                        </p:tgtEl>
+                                        <p:attrNameLst>
+                                          <p:attrName>style.visibility</p:attrName>
+                                        </p:attrNameLst>
+                                      </p:cBhvr>
+                                      <p:to>
+                                        <p:strVal val="visible"/>
+                                      </p:to>
+                                    </p:set>
+                                  </p:childTnLst>
+                                </p:cTn>
+                              </p:par>
+                              <p:par>
+                                <p:cTn id="43" presetID="1" presetClass="entr" presetSubtype="0" fill="hold" grpId="0" nodeType="withEffect">
+                                  <p:stCondLst>
+                                    <p:cond delay="0"/>
+                                  </p:stCondLst>
+                                  <p:childTnLst>
+                                    <p:set>
+                                      <p:cBhvr>
+                                        <p:cTn id="44" dur="1" fill="hold">
+                                          <p:stCondLst>
+                                            <p:cond delay="0"/>
+                                          </p:stCondLst>
+                                        </p:cTn>
+                                        <p:tgtEl>
+                                          <p:spTgt spid="62"/>
+                                        </p:tgtEl>
+                                        <p:attrNameLst>
+                                          <p:attrName>style.visibility</p:attrName>
+                                        </p:attrNameLst>
+                                      </p:cBhvr>
+                                      <p:to>
+                                        <p:strVal val="visible"/>
+                                      </p:to>
+                                    </p:set>
+                                  </p:childTnLst>
+                                </p:cTn>
+                              </p:par>
+                              <p:par>
+                                <p:cTn id="45" presetID="1" presetClass="entr" presetSubtype="0" fill="hold" grpId="0" nodeType="withEffect">
+                                  <p:stCondLst>
+                                    <p:cond delay="0"/>
+                                  </p:stCondLst>
+                                  <p:childTnLst>
+                                    <p:set>
+                                      <p:cBhvr>
+                                        <p:cTn id="46" dur="1" fill="hold">
+                                          <p:stCondLst>
+                                            <p:cond delay="0"/>
+                                          </p:stCondLst>
+                                        </p:cTn>
+                                        <p:tgtEl>
+                                          <p:spTgt spid="68"/>
+                                        </p:tgtEl>
+                                        <p:attrNameLst>
+                                          <p:attrName>style.visibility</p:attrName>
+                                        </p:attrNameLst>
+                                      </p:cBhvr>
+                                      <p:to>
+                                        <p:strVal val="visible"/>
+                                      </p:to>
+                                    </p:set>
+                                  </p:childTnLst>
+                                </p:cTn>
+                              </p:par>
+                            </p:childTnLst>
+                          </p:cTn>
+                        </p:par>
+                      </p:childTnLst>
+                    </p:cTn>
+                  </p:par>
+                  <p:par>
+                    <p:cTn id="47" fill="hold">
+                      <p:stCondLst>
+                        <p:cond delay="indefinite"/>
+                      </p:stCondLst>
+                      <p:childTnLst>
+                        <p:par>
+                          <p:cTn id="48" fill="hold">
+                            <p:stCondLst>
+                              <p:cond delay="0"/>
+                            </p:stCondLst>
+                            <p:childTnLst>
+                              <p:par>
+                                <p:cTn id="49" presetID="1" presetClass="entr" presetSubtype="0" fill="hold" nodeType="clickEffect">
+                                  <p:stCondLst>
+                                    <p:cond delay="0"/>
+                                  </p:stCondLst>
+                                  <p:childTnLst>
+                                    <p:set>
+                                      <p:cBhvr>
+                                        <p:cTn id="50" dur="1" fill="hold">
+                                          <p:stCondLst>
+                                            <p:cond delay="0"/>
+                                          </p:stCondLst>
+                                        </p:cTn>
+                                        <p:tgtEl>
+                                          <p:spTgt spid="11"/>
+                                        </p:tgtEl>
+                                        <p:attrNameLst>
+                                          <p:attrName>style.visibility</p:attrName>
+                                        </p:attrNameLst>
+                                      </p:cBhvr>
+                                      <p:to>
+                                        <p:strVal val="visible"/>
+                                      </p:to>
+                                    </p:set>
+                                  </p:childTnLst>
+                                </p:cTn>
+                              </p:par>
+                              <p:par>
+                                <p:cTn id="51" presetID="1" presetClass="entr" presetSubtype="0" fill="hold" grpId="0" nodeType="withEffect">
+                                  <p:stCondLst>
+                                    <p:cond delay="0"/>
+                                  </p:stCondLst>
+                                  <p:childTnLst>
+                                    <p:set>
+                                      <p:cBhvr>
+                                        <p:cTn id="52" dur="1" fill="hold">
+                                          <p:stCondLst>
+                                            <p:cond delay="0"/>
+                                          </p:stCondLst>
+                                        </p:cTn>
+                                        <p:tgtEl>
+                                          <p:spTgt spid="113"/>
+                                        </p:tgtEl>
+                                        <p:attrNameLst>
+                                          <p:attrName>style.visibility</p:attrName>
+                                        </p:attrNameLst>
+                                      </p:cBhvr>
+                                      <p:to>
+                                        <p:strVal val="visible"/>
+                                      </p:to>
+                                    </p:set>
+                                  </p:childTnLst>
+                                </p:cTn>
+                              </p:par>
+                              <p:par>
+                                <p:cTn id="53" presetID="1" presetClass="entr" presetSubtype="0" fill="hold" nodeType="withEffect">
+                                  <p:stCondLst>
+                                    <p:cond delay="0"/>
+                                  </p:stCondLst>
+                                  <p:childTnLst>
+                                    <p:set>
+                                      <p:cBhvr>
+                                        <p:cTn id="54" dur="1" fill="hold">
+                                          <p:stCondLst>
+                                            <p:cond delay="0"/>
+                                          </p:stCondLst>
+                                        </p:cTn>
+                                        <p:tgtEl>
+                                          <p:spTgt spid="69"/>
+                                        </p:tgtEl>
+                                        <p:attrNameLst>
+                                          <p:attrName>style.visibility</p:attrName>
+                                        </p:attrNameLst>
+                                      </p:cBhvr>
+                                      <p:to>
+                                        <p:strVal val="visible"/>
+                                      </p:to>
+                                    </p:set>
+                                  </p:childTnLst>
+                                </p:cTn>
+                              </p:par>
+                              <p:par>
+                                <p:cTn id="55" presetID="1" presetClass="entr" presetSubtype="0" fill="hold" nodeType="withEffect">
+                                  <p:stCondLst>
+                                    <p:cond delay="0"/>
+                                  </p:stCondLst>
+                                  <p:childTnLst>
+                                    <p:set>
+                                      <p:cBhvr>
+                                        <p:cTn id="56" dur="1" fill="hold">
+                                          <p:stCondLst>
+                                            <p:cond delay="0"/>
+                                          </p:stCondLst>
+                                        </p:cTn>
+                                        <p:tgtEl>
+                                          <p:spTgt spid="89"/>
+                                        </p:tgtEl>
+                                        <p:attrNameLst>
+                                          <p:attrName>style.visibility</p:attrName>
+                                        </p:attrNameLst>
+                                      </p:cBhvr>
+                                      <p:to>
+                                        <p:strVal val="visible"/>
+                                      </p:to>
+                                    </p:set>
+                                  </p:childTnLst>
+                                </p:cTn>
+                              </p:par>
+                              <p:par>
+                                <p:cTn id="57" presetID="1" presetClass="entr" presetSubtype="0" fill="hold" grpId="0" nodeType="withEffect">
+                                  <p:stCondLst>
+                                    <p:cond delay="0"/>
+                                  </p:stCondLst>
+                                  <p:childTnLst>
+                                    <p:set>
+                                      <p:cBhvr>
+                                        <p:cTn id="58" dur="1" fill="hold">
+                                          <p:stCondLst>
+                                            <p:cond delay="0"/>
+                                          </p:stCondLst>
+                                        </p:cTn>
+                                        <p:tgtEl>
+                                          <p:spTgt spid="49"/>
+                                        </p:tgtEl>
+                                        <p:attrNameLst>
+                                          <p:attrName>style.visibility</p:attrName>
+                                        </p:attrNameLst>
+                                      </p:cBhvr>
+                                      <p:to>
+                                        <p:strVal val="visible"/>
+                                      </p:to>
+                                    </p:set>
+                                  </p:childTnLst>
+                                </p:cTn>
+                              </p:par>
+                              <p:par>
+                                <p:cTn id="59" presetID="1" presetClass="entr" presetSubtype="0" fill="hold" grpId="0" nodeType="withEffect">
+                                  <p:stCondLst>
+                                    <p:cond delay="0"/>
+                                  </p:stCondLst>
+                                  <p:childTnLst>
+                                    <p:set>
+                                      <p:cBhvr>
+                                        <p:cTn id="60" dur="1" fill="hold">
+                                          <p:stCondLst>
+                                            <p:cond delay="0"/>
+                                          </p:stCondLst>
+                                        </p:cTn>
+                                        <p:tgtEl>
+                                          <p:spTgt spid="42"/>
+                                        </p:tgtEl>
+                                        <p:attrNameLst>
+                                          <p:attrName>style.visibility</p:attrName>
+                                        </p:attrNameLst>
+                                      </p:cBhvr>
+                                      <p:to>
+                                        <p:strVal val="visible"/>
+                                      </p:to>
+                                    </p:set>
+                                  </p:childTnLst>
+                                </p:cTn>
+                              </p:par>
+                            </p:childTnLst>
+                          </p:cTn>
+                        </p:par>
+                      </p:childTnLst>
+                    </p:cTn>
+                  </p:par>
+                  <p:par>
+                    <p:cTn id="61" fill="hold">
+                      <p:stCondLst>
+                        <p:cond delay="indefinite"/>
+                      </p:stCondLst>
+                      <p:childTnLst>
+                        <p:par>
+                          <p:cTn id="62" fill="hold">
+                            <p:stCondLst>
+                              <p:cond delay="0"/>
+                            </p:stCondLst>
+                            <p:childTnLst>
+                              <p:par>
+                                <p:cTn id="63" presetID="1" presetClass="entr" presetSubtype="0" fill="hold" grpId="0" nodeType="clickEffect">
+                                  <p:stCondLst>
+                                    <p:cond delay="0"/>
+                                  </p:stCondLst>
+                                  <p:childTnLst>
+                                    <p:set>
+                                      <p:cBhvr>
+                                        <p:cTn id="64" dur="1" fill="hold">
+                                          <p:stCondLst>
+                                            <p:cond delay="0"/>
+                                          </p:stCondLst>
+                                        </p:cTn>
+                                        <p:tgtEl>
+                                          <p:spTgt spid="24"/>
+                                        </p:tgtEl>
+                                        <p:attrNameLst>
+                                          <p:attrName>style.visibility</p:attrName>
+                                        </p:attrNameLst>
+                                      </p:cBhvr>
+                                      <p:to>
+                                        <p:strVal val="visible"/>
+                                      </p:to>
+                                    </p:set>
+                                  </p:childTnLst>
+                                </p:cTn>
+                              </p:par>
+                              <p:par>
+                                <p:cTn id="65" presetID="1" presetClass="entr" presetSubtype="0" fill="hold" grpId="0" nodeType="withEffect">
+                                  <p:stCondLst>
+                                    <p:cond delay="0"/>
+                                  </p:stCondLst>
+                                  <p:childTnLst>
+                                    <p:set>
+                                      <p:cBhvr>
+                                        <p:cTn id="66" dur="1" fill="hold">
+                                          <p:stCondLst>
+                                            <p:cond delay="0"/>
+                                          </p:stCondLst>
+                                        </p:cTn>
+                                        <p:tgtEl>
+                                          <p:spTgt spid="51"/>
+                                        </p:tgtEl>
+                                        <p:attrNameLst>
+                                          <p:attrName>style.visibility</p:attrName>
+                                        </p:attrNameLst>
+                                      </p:cBhvr>
+                                      <p:to>
+                                        <p:strVal val="visible"/>
+                                      </p:to>
+                                    </p:set>
+                                  </p:childTnLst>
+                                </p:cTn>
+                              </p:par>
+                              <p:par>
+                                <p:cTn id="67" presetID="1" presetClass="entr" presetSubtype="0" fill="hold" grpId="0" nodeType="withEffect">
+                                  <p:stCondLst>
+                                    <p:cond delay="0"/>
+                                  </p:stCondLst>
+                                  <p:childTnLst>
+                                    <p:set>
+                                      <p:cBhvr>
+                                        <p:cTn id="68" dur="1" fill="hold">
+                                          <p:stCondLst>
+                                            <p:cond delay="0"/>
+                                          </p:stCondLst>
+                                        </p:cTn>
+                                        <p:tgtEl>
+                                          <p:spTgt spid="66"/>
+                                        </p:tgtEl>
+                                        <p:attrNameLst>
+                                          <p:attrName>style.visibility</p:attrName>
+                                        </p:attrNameLst>
+                                      </p:cBhvr>
+                                      <p:to>
+                                        <p:strVal val="visible"/>
+                                      </p:to>
+                                    </p:set>
+                                  </p:childTnLst>
+                                </p:cTn>
+                              </p:par>
+                              <p:par>
+                                <p:cTn id="69" presetID="1" presetClass="entr" presetSubtype="0" fill="hold" grpId="0" nodeType="withEffect">
+                                  <p:stCondLst>
+                                    <p:cond delay="0"/>
+                                  </p:stCondLst>
+                                  <p:childTnLst>
+                                    <p:set>
+                                      <p:cBhvr>
+                                        <p:cTn id="70" dur="1" fill="hold">
+                                          <p:stCondLst>
+                                            <p:cond delay="0"/>
+                                          </p:stCondLst>
+                                        </p:cTn>
+                                        <p:tgtEl>
+                                          <p:spTgt spid="67"/>
+                                        </p:tgtEl>
+                                        <p:attrNameLst>
+                                          <p:attrName>style.visibility</p:attrName>
+                                        </p:attrNameLst>
+                                      </p:cBhvr>
+                                      <p:to>
+                                        <p:strVal val="visible"/>
+                                      </p:to>
+                                    </p:set>
+                                  </p:childTnLst>
+                                </p:cTn>
+                              </p:par>
+                              <p:par>
+                                <p:cTn id="71" presetID="1" presetClass="entr" presetSubtype="0" fill="hold" nodeType="withEffect">
+                                  <p:stCondLst>
+                                    <p:cond delay="0"/>
+                                  </p:stCondLst>
+                                  <p:childTnLst>
+                                    <p:set>
+                                      <p:cBhvr>
+                                        <p:cTn id="72" dur="1" fill="hold">
+                                          <p:stCondLst>
+                                            <p:cond delay="0"/>
+                                          </p:stCondLst>
+                                        </p:cTn>
+                                        <p:tgtEl>
+                                          <p:spTgt spid="76"/>
+                                        </p:tgtEl>
+                                        <p:attrNameLst>
+                                          <p:attrName>style.visibility</p:attrName>
+                                        </p:attrNameLst>
+                                      </p:cBhvr>
+                                      <p:to>
+                                        <p:strVal val="visible"/>
+                                      </p:to>
+                                    </p:set>
+                                  </p:childTnLst>
+                                </p:cTn>
+                              </p:par>
+                              <p:par>
+                                <p:cTn id="73" presetID="1" presetClass="entr" presetSubtype="0" fill="hold" grpId="0" nodeType="withEffect">
+                                  <p:stCondLst>
+                                    <p:cond delay="0"/>
+                                  </p:stCondLst>
+                                  <p:childTnLst>
+                                    <p:set>
+                                      <p:cBhvr>
+                                        <p:cTn id="74" dur="1" fill="hold">
+                                          <p:stCondLst>
+                                            <p:cond delay="0"/>
+                                          </p:stCondLst>
+                                        </p:cTn>
+                                        <p:tgtEl>
+                                          <p:spTgt spid="85"/>
+                                        </p:tgtEl>
+                                        <p:attrNameLst>
+                                          <p:attrName>style.visibility</p:attrName>
+                                        </p:attrNameLst>
+                                      </p:cBhvr>
+                                      <p:to>
+                                        <p:strVal val="visible"/>
+                                      </p:to>
+                                    </p:set>
+                                  </p:childTnLst>
+                                </p:cTn>
+                              </p:par>
+                              <p:par>
+                                <p:cTn id="75" presetID="1" presetClass="entr" presetSubtype="0" fill="hold" nodeType="withEffect">
+                                  <p:stCondLst>
+                                    <p:cond delay="0"/>
+                                  </p:stCondLst>
+                                  <p:childTnLst>
+                                    <p:set>
+                                      <p:cBhvr>
+                                        <p:cTn id="76" dur="1" fill="hold">
+                                          <p:stCondLst>
+                                            <p:cond delay="0"/>
+                                          </p:stCondLst>
+                                        </p:cTn>
+                                        <p:tgtEl>
+                                          <p:spTgt spid="82"/>
+                                        </p:tgtEl>
+                                        <p:attrNameLst>
+                                          <p:attrName>style.visibility</p:attrName>
+                                        </p:attrNameLst>
+                                      </p:cBhvr>
+                                      <p:to>
+                                        <p:strVal val="visible"/>
+                                      </p:to>
+                                    </p:set>
+                                  </p:childTnLst>
+                                </p:cTn>
+                              </p:par>
+                              <p:par>
+                                <p:cTn id="77" presetID="1" presetClass="entr" presetSubtype="0" fill="hold" nodeType="withEffect">
+                                  <p:stCondLst>
+                                    <p:cond delay="0"/>
+                                  </p:stCondLst>
+                                  <p:childTnLst>
+                                    <p:set>
+                                      <p:cBhvr>
+                                        <p:cTn id="78" dur="1" fill="hold">
+                                          <p:stCondLst>
+                                            <p:cond delay="0"/>
+                                          </p:stCondLst>
+                                        </p:cTn>
+                                        <p:tgtEl>
+                                          <p:spTgt spid="114"/>
+                                        </p:tgtEl>
+                                        <p:attrNameLst>
+                                          <p:attrName>style.visibility</p:attrName>
+                                        </p:attrNameLst>
+                                      </p:cBhvr>
+                                      <p:to>
+                                        <p:strVal val="visible"/>
+                                      </p:to>
+                                    </p:set>
+                                  </p:childTnLst>
+                                </p:cTn>
+                              </p:par>
+                              <p:par>
+                                <p:cTn id="79" presetID="1" presetClass="entr" presetSubtype="0" fill="hold" grpId="0" nodeType="withEffect">
+                                  <p:stCondLst>
+                                    <p:cond delay="0"/>
+                                  </p:stCondLst>
+                                  <p:childTnLst>
+                                    <p:set>
+                                      <p:cBhvr>
+                                        <p:cTn id="80" dur="1" fill="hold">
+                                          <p:stCondLst>
+                                            <p:cond delay="0"/>
+                                          </p:stCondLst>
+                                        </p:cTn>
+                                        <p:tgtEl>
+                                          <p:spTgt spid="117"/>
+                                        </p:tgtEl>
+                                        <p:attrNameLst>
+                                          <p:attrName>style.visibility</p:attrName>
+                                        </p:attrNameLst>
+                                      </p:cBhvr>
+                                      <p:to>
+                                        <p:strVal val="visible"/>
+                                      </p:to>
+                                    </p:set>
+                                  </p:childTnLst>
+                                </p:cTn>
+                              </p:par>
+                            </p:childTnLst>
+                          </p:cTn>
+                        </p:par>
+                      </p:childTnLst>
+                    </p:cTn>
+                  </p:par>
+                  <p:par>
+                    <p:cTn id="81" fill="hold">
+                      <p:stCondLst>
+                        <p:cond delay="indefinite"/>
+                      </p:stCondLst>
+                      <p:childTnLst>
+                        <p:par>
+                          <p:cTn id="82" fill="hold">
+                            <p:stCondLst>
+                              <p:cond delay="0"/>
+                            </p:stCondLst>
+                            <p:childTnLst>
+                              <p:par>
+                                <p:cTn id="83" presetID="1" presetClass="entr" presetSubtype="0" fill="hold" nodeType="clickEffect">
+                                  <p:stCondLst>
+                                    <p:cond delay="0"/>
+                                  </p:stCondLst>
+                                  <p:childTnLst>
+                                    <p:set>
+                                      <p:cBhvr>
+                                        <p:cTn id="84" dur="1" fill="hold">
+                                          <p:stCondLst>
+                                            <p:cond delay="0"/>
+                                          </p:stCondLst>
+                                        </p:cTn>
+                                        <p:tgtEl>
+                                          <p:spTgt spid="129"/>
+                                        </p:tgtEl>
+                                        <p:attrNameLst>
+                                          <p:attrName>style.visibility</p:attrName>
+                                        </p:attrNameLst>
+                                      </p:cBhvr>
+                                      <p:to>
+                                        <p:strVal val="visible"/>
+                                      </p:to>
+                                    </p:set>
+                                  </p:childTnLst>
+                                </p:cTn>
+                              </p:par>
+                              <p:par>
+                                <p:cTn id="85" presetID="1" presetClass="entr" presetSubtype="0" fill="hold" nodeType="withEffect">
+                                  <p:stCondLst>
+                                    <p:cond delay="0"/>
+                                  </p:stCondLst>
+                                  <p:childTnLst>
+                                    <p:set>
+                                      <p:cBhvr>
+                                        <p:cTn id="86" dur="1" fill="hold">
+                                          <p:stCondLst>
+                                            <p:cond delay="0"/>
+                                          </p:stCondLst>
+                                        </p:cTn>
+                                        <p:tgtEl>
+                                          <p:spTgt spid="126"/>
+                                        </p:tgtEl>
+                                        <p:attrNameLst>
+                                          <p:attrName>style.visibility</p:attrName>
+                                        </p:attrNameLst>
+                                      </p:cBhvr>
+                                      <p:to>
+                                        <p:strVal val="visible"/>
+                                      </p:to>
+                                    </p:set>
+                                  </p:childTnLst>
+                                </p:cTn>
+                              </p:par>
+                            </p:childTnLst>
+                          </p:cTn>
+                        </p:par>
+                      </p:childTnLst>
+                    </p:cTn>
+                  </p:par>
+                </p:childTnLst>
+              </p:cTn>
+              <p:prevCondLst>
+                <p:cond evt="onPrev" delay="0">
+                  <p:tgtEl>
+                    <p:sldTgt/>
+                  </p:tgtEl>
+                </p:cond>
+              </p:prevCondLst>
+              <p:nextCondLst>
+                <p:cond evt="onNext" delay="0">
+                  <p:tgtEl>
+                    <p:sldTgt/>
+                  </p:tgtEl>
+                </p:cond>
+              </p:nextCondLst>
+            </p:seq>
+          </p:childTnLst>
+        </p:cTn>
+      </p:par>
+    </p:tnLst>
+    <p:bldLst>
+      <p:bldP spid="16" grpId="0" animBg="1"/>
+      <p:bldP spid="17" grpId="0" animBg="1"/>
+      <p:bldP spid="19" grpId="0"/>
+      <p:bldP spid="20" grpId="0"/>
+      <p:bldP spid="24" grpId="0"/>
+      <p:bldP spid="35" grpId="0" animBg="1"/>
+      <p:bldP spid="36" grpId="0" animBg="1"/>
+      <p:bldP spid="37" grpId="0"/>
+      <p:bldP spid="38" grpId="0"/>
+      <p:bldP spid="42" grpId="0"/>
+      <p:bldP spid="49" grpId="0"/>
+      <p:bldP spid="50" grpId="0"/>
+      <p:bldP spid="51" grpId="0"/>
+      <p:bldP spid="52" grpId="0"/>
+      <p:bldP spid="59" grpId="0" animBg="1"/>
+      <p:bldP spid="60" grpId="0" animBg="1"/>
+      <p:bldP spid="61" grpId="0"/>
+      <p:bldP spid="62" grpId="0"/>
+      <p:bldP spid="66" grpId="0"/>
+      <p:bldP spid="67" grpId="0"/>
+      <p:bldP spid="68" grpId="0"/>
+      <p:bldP spid="85" grpId="0"/>
+      <p:bldP spid="113" grpId="0"/>
+      <p:bldP spid="117" grpId="0"/>
+    </p:bldLst>
+  </p:timing>
 </p:sld>
 </file>
 

</xml_diff>